<commit_message>
adds some arrows to the LED's so people can see they are LED's
</commit_message>
<xml_diff>
--- a/presentations/privacy.pptx
+++ b/presentations/privacy.pptx
@@ -4,8 +4,19 @@
   <p:sldMasterIdLst>
     <p:sldMasterId id="2147483648" r:id="rId1"/>
   </p:sldMasterIdLst>
+  <p:notesMasterIdLst>
+    <p:notesMasterId r:id="rId11"/>
+  </p:notesMasterIdLst>
   <p:sldIdLst>
     <p:sldId id="256" r:id="rId2"/>
+    <p:sldId id="262" r:id="rId3"/>
+    <p:sldId id="258" r:id="rId4"/>
+    <p:sldId id="259" r:id="rId5"/>
+    <p:sldId id="260" r:id="rId6"/>
+    <p:sldId id="261" r:id="rId7"/>
+    <p:sldId id="264" r:id="rId8"/>
+    <p:sldId id="263" r:id="rId9"/>
+    <p:sldId id="257" r:id="rId10"/>
   </p:sldIdLst>
   <p:sldSz cx="12192000" cy="6858000"/>
   <p:notesSz cx="6858000" cy="9144000"/>
@@ -104,7 +115,1144 @@
       </a:defRPr>
     </a:lvl9pPr>
   </p:defaultTextStyle>
+  <p:extLst>
+    <p:ext uri="{EFAFB233-063F-42B5-8137-9DF3F51BA10A}">
+      <p15:sldGuideLst xmlns:p15="http://schemas.microsoft.com/office/powerpoint/2012/main"/>
+    </p:ext>
+  </p:extLst>
 </p:presentation>
+</file>
+
+<file path=ppt/notesMasters/notesMaster1.xml><?xml version="1.0" encoding="utf-8"?>
+<p:notesMaster xmlns:a="http://schemas.openxmlformats.org/drawingml/2006/main" xmlns:r="http://schemas.openxmlformats.org/officeDocument/2006/relationships" xmlns:p="http://schemas.openxmlformats.org/presentationml/2006/main">
+  <p:cSld>
+    <p:bg>
+      <p:bgRef idx="1001">
+        <a:schemeClr val="bg1"/>
+      </p:bgRef>
+    </p:bg>
+    <p:spTree>
+      <p:nvGrpSpPr>
+        <p:cNvPr id="1" name=""/>
+        <p:cNvGrpSpPr/>
+        <p:nvPr/>
+      </p:nvGrpSpPr>
+      <p:grpSpPr>
+        <a:xfrm>
+          <a:off x="0" y="0"/>
+          <a:ext cx="0" cy="0"/>
+          <a:chOff x="0" y="0"/>
+          <a:chExt cx="0" cy="0"/>
+        </a:xfrm>
+      </p:grpSpPr>
+      <p:sp>
+        <p:nvSpPr>
+          <p:cNvPr id="2" name="Header Placeholder 1"/>
+          <p:cNvSpPr>
+            <a:spLocks noGrp="1"/>
+          </p:cNvSpPr>
+          <p:nvPr>
+            <p:ph type="hdr" sz="quarter"/>
+          </p:nvPr>
+        </p:nvSpPr>
+        <p:spPr>
+          <a:xfrm>
+            <a:off x="0" y="0"/>
+            <a:ext cx="2971800" cy="458788"/>
+          </a:xfrm>
+          <a:prstGeom prst="rect">
+            <a:avLst/>
+          </a:prstGeom>
+        </p:spPr>
+        <p:txBody>
+          <a:bodyPr vert="horz" lIns="91440" tIns="45720" rIns="91440" bIns="45720" rtlCol="0"/>
+          <a:lstStyle>
+            <a:lvl1pPr algn="l">
+              <a:defRPr sz="1200"/>
+            </a:lvl1pPr>
+          </a:lstStyle>
+          <a:p>
+            <a:endParaRPr lang="en-US"/>
+          </a:p>
+        </p:txBody>
+      </p:sp>
+      <p:sp>
+        <p:nvSpPr>
+          <p:cNvPr id="3" name="Date Placeholder 2"/>
+          <p:cNvSpPr>
+            <a:spLocks noGrp="1"/>
+          </p:cNvSpPr>
+          <p:nvPr>
+            <p:ph type="dt" idx="1"/>
+          </p:nvPr>
+        </p:nvSpPr>
+        <p:spPr>
+          <a:xfrm>
+            <a:off x="3884613" y="0"/>
+            <a:ext cx="2971800" cy="458788"/>
+          </a:xfrm>
+          <a:prstGeom prst="rect">
+            <a:avLst/>
+          </a:prstGeom>
+        </p:spPr>
+        <p:txBody>
+          <a:bodyPr vert="horz" lIns="91440" tIns="45720" rIns="91440" bIns="45720" rtlCol="0"/>
+          <a:lstStyle>
+            <a:lvl1pPr algn="r">
+              <a:defRPr sz="1200"/>
+            </a:lvl1pPr>
+          </a:lstStyle>
+          <a:p>
+            <a:fld id="{75215D27-A22D-D14A-ABA2-0E7994364DC8}" type="datetimeFigureOut">
+              <a:rPr lang="en-US" smtClean="0"/>
+              <a:t>3/1/21</a:t>
+            </a:fld>
+            <a:endParaRPr lang="en-US"/>
+          </a:p>
+        </p:txBody>
+      </p:sp>
+      <p:sp>
+        <p:nvSpPr>
+          <p:cNvPr id="4" name="Slide Image Placeholder 3"/>
+          <p:cNvSpPr>
+            <a:spLocks noGrp="1" noRot="1" noChangeAspect="1"/>
+          </p:cNvSpPr>
+          <p:nvPr>
+            <p:ph type="sldImg" idx="2"/>
+          </p:nvPr>
+        </p:nvSpPr>
+        <p:spPr>
+          <a:xfrm>
+            <a:off x="685800" y="1143000"/>
+            <a:ext cx="5486400" cy="3086100"/>
+          </a:xfrm>
+          <a:prstGeom prst="rect">
+            <a:avLst/>
+          </a:prstGeom>
+          <a:noFill/>
+          <a:ln w="12700">
+            <a:solidFill>
+              <a:prstClr val="black"/>
+            </a:solidFill>
+          </a:ln>
+        </p:spPr>
+        <p:txBody>
+          <a:bodyPr vert="horz" lIns="91440" tIns="45720" rIns="91440" bIns="45720" rtlCol="0" anchor="ctr"/>
+          <a:lstStyle/>
+          <a:p>
+            <a:endParaRPr lang="en-US"/>
+          </a:p>
+        </p:txBody>
+      </p:sp>
+      <p:sp>
+        <p:nvSpPr>
+          <p:cNvPr id="5" name="Notes Placeholder 4"/>
+          <p:cNvSpPr>
+            <a:spLocks noGrp="1"/>
+          </p:cNvSpPr>
+          <p:nvPr>
+            <p:ph type="body" sz="quarter" idx="3"/>
+          </p:nvPr>
+        </p:nvSpPr>
+        <p:spPr>
+          <a:xfrm>
+            <a:off x="685800" y="4400550"/>
+            <a:ext cx="5486400" cy="3600450"/>
+          </a:xfrm>
+          <a:prstGeom prst="rect">
+            <a:avLst/>
+          </a:prstGeom>
+        </p:spPr>
+        <p:txBody>
+          <a:bodyPr vert="horz" lIns="91440" tIns="45720" rIns="91440" bIns="45720" rtlCol="0"/>
+          <a:lstStyle/>
+          <a:p>
+            <a:pPr lvl="0"/>
+            <a:r>
+              <a:rPr lang="en-GB"/>
+              <a:t>Click to edit Master text styles</a:t>
+            </a:r>
+          </a:p>
+          <a:p>
+            <a:pPr lvl="1"/>
+            <a:r>
+              <a:rPr lang="en-GB"/>
+              <a:t>Second level</a:t>
+            </a:r>
+          </a:p>
+          <a:p>
+            <a:pPr lvl="2"/>
+            <a:r>
+              <a:rPr lang="en-GB"/>
+              <a:t>Third level</a:t>
+            </a:r>
+          </a:p>
+          <a:p>
+            <a:pPr lvl="3"/>
+            <a:r>
+              <a:rPr lang="en-GB"/>
+              <a:t>Fourth level</a:t>
+            </a:r>
+          </a:p>
+          <a:p>
+            <a:pPr lvl="4"/>
+            <a:r>
+              <a:rPr lang="en-GB"/>
+              <a:t>Fifth level</a:t>
+            </a:r>
+            <a:endParaRPr lang="en-US"/>
+          </a:p>
+        </p:txBody>
+      </p:sp>
+      <p:sp>
+        <p:nvSpPr>
+          <p:cNvPr id="6" name="Footer Placeholder 5"/>
+          <p:cNvSpPr>
+            <a:spLocks noGrp="1"/>
+          </p:cNvSpPr>
+          <p:nvPr>
+            <p:ph type="ftr" sz="quarter" idx="4"/>
+          </p:nvPr>
+        </p:nvSpPr>
+        <p:spPr>
+          <a:xfrm>
+            <a:off x="0" y="8685213"/>
+            <a:ext cx="2971800" cy="458787"/>
+          </a:xfrm>
+          <a:prstGeom prst="rect">
+            <a:avLst/>
+          </a:prstGeom>
+        </p:spPr>
+        <p:txBody>
+          <a:bodyPr vert="horz" lIns="91440" tIns="45720" rIns="91440" bIns="45720" rtlCol="0" anchor="b"/>
+          <a:lstStyle>
+            <a:lvl1pPr algn="l">
+              <a:defRPr sz="1200"/>
+            </a:lvl1pPr>
+          </a:lstStyle>
+          <a:p>
+            <a:endParaRPr lang="en-US"/>
+          </a:p>
+        </p:txBody>
+      </p:sp>
+      <p:sp>
+        <p:nvSpPr>
+          <p:cNvPr id="7" name="Slide Number Placeholder 6"/>
+          <p:cNvSpPr>
+            <a:spLocks noGrp="1"/>
+          </p:cNvSpPr>
+          <p:nvPr>
+            <p:ph type="sldNum" sz="quarter" idx="5"/>
+          </p:nvPr>
+        </p:nvSpPr>
+        <p:spPr>
+          <a:xfrm>
+            <a:off x="3884613" y="8685213"/>
+            <a:ext cx="2971800" cy="458787"/>
+          </a:xfrm>
+          <a:prstGeom prst="rect">
+            <a:avLst/>
+          </a:prstGeom>
+        </p:spPr>
+        <p:txBody>
+          <a:bodyPr vert="horz" lIns="91440" tIns="45720" rIns="91440" bIns="45720" rtlCol="0" anchor="b"/>
+          <a:lstStyle>
+            <a:lvl1pPr algn="r">
+              <a:defRPr sz="1200"/>
+            </a:lvl1pPr>
+          </a:lstStyle>
+          <a:p>
+            <a:fld id="{96DA3624-76B2-9B40-BE05-B95AD43EDBF4}" type="slidenum">
+              <a:rPr lang="en-US" smtClean="0"/>
+              <a:t>‹#›</a:t>
+            </a:fld>
+            <a:endParaRPr lang="en-US"/>
+          </a:p>
+        </p:txBody>
+      </p:sp>
+    </p:spTree>
+    <p:extLst>
+      <p:ext uri="{BB962C8B-B14F-4D97-AF65-F5344CB8AC3E}">
+        <p14:creationId xmlns:p14="http://schemas.microsoft.com/office/powerpoint/2010/main" val="606117887"/>
+      </p:ext>
+    </p:extLst>
+  </p:cSld>
+  <p:clrMap bg1="lt1" tx1="dk1" bg2="lt2" tx2="dk2" accent1="accent1" accent2="accent2" accent3="accent3" accent4="accent4" accent5="accent5" accent6="accent6" hlink="hlink" folHlink="folHlink"/>
+  <p:notesStyle>
+    <a:lvl1pPr marL="0" algn="l" defTabSz="914400" rtl="0" eaLnBrk="1" latinLnBrk="0" hangingPunct="1">
+      <a:defRPr sz="1200" kern="1200">
+        <a:solidFill>
+          <a:schemeClr val="tx1"/>
+        </a:solidFill>
+        <a:latin typeface="+mn-lt"/>
+        <a:ea typeface="+mn-ea"/>
+        <a:cs typeface="+mn-cs"/>
+      </a:defRPr>
+    </a:lvl1pPr>
+    <a:lvl2pPr marL="457200" algn="l" defTabSz="914400" rtl="0" eaLnBrk="1" latinLnBrk="0" hangingPunct="1">
+      <a:defRPr sz="1200" kern="1200">
+        <a:solidFill>
+          <a:schemeClr val="tx1"/>
+        </a:solidFill>
+        <a:latin typeface="+mn-lt"/>
+        <a:ea typeface="+mn-ea"/>
+        <a:cs typeface="+mn-cs"/>
+      </a:defRPr>
+    </a:lvl2pPr>
+    <a:lvl3pPr marL="914400" algn="l" defTabSz="914400" rtl="0" eaLnBrk="1" latinLnBrk="0" hangingPunct="1">
+      <a:defRPr sz="1200" kern="1200">
+        <a:solidFill>
+          <a:schemeClr val="tx1"/>
+        </a:solidFill>
+        <a:latin typeface="+mn-lt"/>
+        <a:ea typeface="+mn-ea"/>
+        <a:cs typeface="+mn-cs"/>
+      </a:defRPr>
+    </a:lvl3pPr>
+    <a:lvl4pPr marL="1371600" algn="l" defTabSz="914400" rtl="0" eaLnBrk="1" latinLnBrk="0" hangingPunct="1">
+      <a:defRPr sz="1200" kern="1200">
+        <a:solidFill>
+          <a:schemeClr val="tx1"/>
+        </a:solidFill>
+        <a:latin typeface="+mn-lt"/>
+        <a:ea typeface="+mn-ea"/>
+        <a:cs typeface="+mn-cs"/>
+      </a:defRPr>
+    </a:lvl4pPr>
+    <a:lvl5pPr marL="1828800" algn="l" defTabSz="914400" rtl="0" eaLnBrk="1" latinLnBrk="0" hangingPunct="1">
+      <a:defRPr sz="1200" kern="1200">
+        <a:solidFill>
+          <a:schemeClr val="tx1"/>
+        </a:solidFill>
+        <a:latin typeface="+mn-lt"/>
+        <a:ea typeface="+mn-ea"/>
+        <a:cs typeface="+mn-cs"/>
+      </a:defRPr>
+    </a:lvl5pPr>
+    <a:lvl6pPr marL="2286000" algn="l" defTabSz="914400" rtl="0" eaLnBrk="1" latinLnBrk="0" hangingPunct="1">
+      <a:defRPr sz="1200" kern="1200">
+        <a:solidFill>
+          <a:schemeClr val="tx1"/>
+        </a:solidFill>
+        <a:latin typeface="+mn-lt"/>
+        <a:ea typeface="+mn-ea"/>
+        <a:cs typeface="+mn-cs"/>
+      </a:defRPr>
+    </a:lvl6pPr>
+    <a:lvl7pPr marL="2743200" algn="l" defTabSz="914400" rtl="0" eaLnBrk="1" latinLnBrk="0" hangingPunct="1">
+      <a:defRPr sz="1200" kern="1200">
+        <a:solidFill>
+          <a:schemeClr val="tx1"/>
+        </a:solidFill>
+        <a:latin typeface="+mn-lt"/>
+        <a:ea typeface="+mn-ea"/>
+        <a:cs typeface="+mn-cs"/>
+      </a:defRPr>
+    </a:lvl7pPr>
+    <a:lvl8pPr marL="3200400" algn="l" defTabSz="914400" rtl="0" eaLnBrk="1" latinLnBrk="0" hangingPunct="1">
+      <a:defRPr sz="1200" kern="1200">
+        <a:solidFill>
+          <a:schemeClr val="tx1"/>
+        </a:solidFill>
+        <a:latin typeface="+mn-lt"/>
+        <a:ea typeface="+mn-ea"/>
+        <a:cs typeface="+mn-cs"/>
+      </a:defRPr>
+    </a:lvl8pPr>
+    <a:lvl9pPr marL="3657600" algn="l" defTabSz="914400" rtl="0" eaLnBrk="1" latinLnBrk="0" hangingPunct="1">
+      <a:defRPr sz="1200" kern="1200">
+        <a:solidFill>
+          <a:schemeClr val="tx1"/>
+        </a:solidFill>
+        <a:latin typeface="+mn-lt"/>
+        <a:ea typeface="+mn-ea"/>
+        <a:cs typeface="+mn-cs"/>
+      </a:defRPr>
+    </a:lvl9pPr>
+  </p:notesStyle>
+</p:notesMaster>
+</file>
+
+<file path=ppt/notesSlides/notesSlide1.xml><?xml version="1.0" encoding="utf-8"?>
+<p:notes xmlns:a="http://schemas.openxmlformats.org/drawingml/2006/main" xmlns:r="http://schemas.openxmlformats.org/officeDocument/2006/relationships" xmlns:p="http://schemas.openxmlformats.org/presentationml/2006/main">
+  <p:cSld>
+    <p:spTree>
+      <p:nvGrpSpPr>
+        <p:cNvPr id="1" name=""/>
+        <p:cNvGrpSpPr/>
+        <p:nvPr/>
+      </p:nvGrpSpPr>
+      <p:grpSpPr>
+        <a:xfrm>
+          <a:off x="0" y="0"/>
+          <a:ext cx="0" cy="0"/>
+          <a:chOff x="0" y="0"/>
+          <a:chExt cx="0" cy="0"/>
+        </a:xfrm>
+      </p:grpSpPr>
+      <p:sp>
+        <p:nvSpPr>
+          <p:cNvPr id="2" name="Slide Image Placeholder 1"/>
+          <p:cNvSpPr>
+            <a:spLocks noGrp="1" noRot="1" noChangeAspect="1"/>
+          </p:cNvSpPr>
+          <p:nvPr>
+            <p:ph type="sldImg"/>
+          </p:nvPr>
+        </p:nvSpPr>
+        <p:spPr/>
+      </p:sp>
+      <p:sp>
+        <p:nvSpPr>
+          <p:cNvPr id="3" name="Notes Placeholder 2"/>
+          <p:cNvSpPr>
+            <a:spLocks noGrp="1"/>
+          </p:cNvSpPr>
+          <p:nvPr>
+            <p:ph type="body" idx="1"/>
+          </p:nvPr>
+        </p:nvSpPr>
+        <p:spPr/>
+        <p:txBody>
+          <a:bodyPr/>
+          <a:lstStyle/>
+          <a:p>
+            <a:r>
+              <a:rPr lang="en-US" dirty="0"/>
+              <a:t>WhatsApp has recently caused quite a stir In the media when they announced an update to their terms and conditions. While the update itself is nothing to worry about, it did spark an interest in me to do some digging into exactly what privacy is, and why everyone should be concerned about it. </a:t>
+            </a:r>
+          </a:p>
+          <a:p>
+            <a:endParaRPr lang="en-US" dirty="0"/>
+          </a:p>
+        </p:txBody>
+      </p:sp>
+      <p:sp>
+        <p:nvSpPr>
+          <p:cNvPr id="4" name="Slide Number Placeholder 3"/>
+          <p:cNvSpPr>
+            <a:spLocks noGrp="1"/>
+          </p:cNvSpPr>
+          <p:nvPr>
+            <p:ph type="sldNum" sz="quarter" idx="5"/>
+          </p:nvPr>
+        </p:nvSpPr>
+        <p:spPr/>
+        <p:txBody>
+          <a:bodyPr/>
+          <a:lstStyle/>
+          <a:p>
+            <a:fld id="{96DA3624-76B2-9B40-BE05-B95AD43EDBF4}" type="slidenum">
+              <a:rPr lang="en-US" smtClean="0"/>
+              <a:t>1</a:t>
+            </a:fld>
+            <a:endParaRPr lang="en-US"/>
+          </a:p>
+        </p:txBody>
+      </p:sp>
+    </p:spTree>
+    <p:extLst>
+      <p:ext uri="{BB962C8B-B14F-4D97-AF65-F5344CB8AC3E}">
+        <p14:creationId xmlns:p14="http://schemas.microsoft.com/office/powerpoint/2010/main" val="1206496436"/>
+      </p:ext>
+    </p:extLst>
+  </p:cSld>
+  <p:clrMapOvr>
+    <a:masterClrMapping/>
+  </p:clrMapOvr>
+</p:notes>
+</file>
+
+<file path=ppt/notesSlides/notesSlide2.xml><?xml version="1.0" encoding="utf-8"?>
+<p:notes xmlns:a="http://schemas.openxmlformats.org/drawingml/2006/main" xmlns:r="http://schemas.openxmlformats.org/officeDocument/2006/relationships" xmlns:p="http://schemas.openxmlformats.org/presentationml/2006/main">
+  <p:cSld>
+    <p:spTree>
+      <p:nvGrpSpPr>
+        <p:cNvPr id="1" name=""/>
+        <p:cNvGrpSpPr/>
+        <p:nvPr/>
+      </p:nvGrpSpPr>
+      <p:grpSpPr>
+        <a:xfrm>
+          <a:off x="0" y="0"/>
+          <a:ext cx="0" cy="0"/>
+          <a:chOff x="0" y="0"/>
+          <a:chExt cx="0" cy="0"/>
+        </a:xfrm>
+      </p:grpSpPr>
+      <p:sp>
+        <p:nvSpPr>
+          <p:cNvPr id="2" name="Slide Image Placeholder 1"/>
+          <p:cNvSpPr>
+            <a:spLocks noGrp="1" noRot="1" noChangeAspect="1"/>
+          </p:cNvSpPr>
+          <p:nvPr>
+            <p:ph type="sldImg"/>
+          </p:nvPr>
+        </p:nvSpPr>
+        <p:spPr/>
+      </p:sp>
+      <p:sp>
+        <p:nvSpPr>
+          <p:cNvPr id="3" name="Notes Placeholder 2"/>
+          <p:cNvSpPr>
+            <a:spLocks noGrp="1"/>
+          </p:cNvSpPr>
+          <p:nvPr>
+            <p:ph type="body" idx="1"/>
+          </p:nvPr>
+        </p:nvSpPr>
+        <p:spPr/>
+        <p:txBody>
+          <a:bodyPr/>
+          <a:lstStyle/>
+          <a:p>
+            <a:r>
+              <a:rPr lang="en-US" dirty="0"/>
+              <a:t>Before we go down this rabbit hole, I would like to take a moment to tell you:</a:t>
+            </a:r>
+          </a:p>
+          <a:p>
+            <a:endParaRPr lang="en-US" dirty="0"/>
+          </a:p>
+          <a:p>
+            <a:r>
+              <a:rPr lang="en-US" dirty="0"/>
+              <a:t> - The idea is not to cause panic, but to inform</a:t>
+            </a:r>
+          </a:p>
+          <a:p>
+            <a:pPr marL="171450" indent="-171450">
+              <a:buFontTx/>
+              <a:buChar char="-"/>
+            </a:pPr>
+            <a:r>
+              <a:rPr lang="en-US" dirty="0"/>
+              <a:t>We are responsible for our own privacy and the companies that I mention are not out to get us, they are out to make a profit</a:t>
+            </a:r>
+          </a:p>
+          <a:p>
+            <a:pPr marL="171450" indent="-171450">
+              <a:buFontTx/>
+              <a:buChar char="-"/>
+            </a:pPr>
+            <a:r>
+              <a:rPr lang="en-US" dirty="0"/>
+              <a:t>I believe that society and end users have caused a lot of the problem that exists today regarding privacy</a:t>
+            </a:r>
+          </a:p>
+          <a:p>
+            <a:pPr marL="628650" lvl="1" indent="-171450">
+              <a:buFontTx/>
+              <a:buChar char="-"/>
+            </a:pPr>
+            <a:r>
+              <a:rPr lang="en-US" dirty="0"/>
+              <a:t>In general, people want digital services for free, but they cost money to produce. </a:t>
+            </a:r>
+          </a:p>
+          <a:p>
+            <a:pPr marL="628650" lvl="1" indent="-171450">
+              <a:buFontTx/>
+              <a:buChar char="-"/>
+            </a:pPr>
+            <a:r>
+              <a:rPr lang="en-US" dirty="0"/>
+              <a:t>We complain about fake news, but so few pay for quality journalism</a:t>
+            </a:r>
+          </a:p>
+        </p:txBody>
+      </p:sp>
+      <p:sp>
+        <p:nvSpPr>
+          <p:cNvPr id="4" name="Slide Number Placeholder 3"/>
+          <p:cNvSpPr>
+            <a:spLocks noGrp="1"/>
+          </p:cNvSpPr>
+          <p:nvPr>
+            <p:ph type="sldNum" sz="quarter" idx="5"/>
+          </p:nvPr>
+        </p:nvSpPr>
+        <p:spPr/>
+        <p:txBody>
+          <a:bodyPr/>
+          <a:lstStyle/>
+          <a:p>
+            <a:fld id="{96DA3624-76B2-9B40-BE05-B95AD43EDBF4}" type="slidenum">
+              <a:rPr lang="en-US" smtClean="0"/>
+              <a:t>2</a:t>
+            </a:fld>
+            <a:endParaRPr lang="en-US"/>
+          </a:p>
+        </p:txBody>
+      </p:sp>
+    </p:spTree>
+    <p:extLst>
+      <p:ext uri="{BB962C8B-B14F-4D97-AF65-F5344CB8AC3E}">
+        <p14:creationId xmlns:p14="http://schemas.microsoft.com/office/powerpoint/2010/main" val="195818881"/>
+      </p:ext>
+    </p:extLst>
+  </p:cSld>
+  <p:clrMapOvr>
+    <a:masterClrMapping/>
+  </p:clrMapOvr>
+</p:notes>
+</file>
+
+<file path=ppt/notesSlides/notesSlide3.xml><?xml version="1.0" encoding="utf-8"?>
+<p:notes xmlns:a="http://schemas.openxmlformats.org/drawingml/2006/main" xmlns:r="http://schemas.openxmlformats.org/officeDocument/2006/relationships" xmlns:p="http://schemas.openxmlformats.org/presentationml/2006/main">
+  <p:cSld>
+    <p:spTree>
+      <p:nvGrpSpPr>
+        <p:cNvPr id="1" name=""/>
+        <p:cNvGrpSpPr/>
+        <p:nvPr/>
+      </p:nvGrpSpPr>
+      <p:grpSpPr>
+        <a:xfrm>
+          <a:off x="0" y="0"/>
+          <a:ext cx="0" cy="0"/>
+          <a:chOff x="0" y="0"/>
+          <a:chExt cx="0" cy="0"/>
+        </a:xfrm>
+      </p:grpSpPr>
+      <p:sp>
+        <p:nvSpPr>
+          <p:cNvPr id="2" name="Slide Image Placeholder 1"/>
+          <p:cNvSpPr>
+            <a:spLocks noGrp="1" noRot="1" noChangeAspect="1"/>
+          </p:cNvSpPr>
+          <p:nvPr>
+            <p:ph type="sldImg"/>
+          </p:nvPr>
+        </p:nvSpPr>
+        <p:spPr/>
+      </p:sp>
+      <p:sp>
+        <p:nvSpPr>
+          <p:cNvPr id="3" name="Notes Placeholder 2"/>
+          <p:cNvSpPr>
+            <a:spLocks noGrp="1"/>
+          </p:cNvSpPr>
+          <p:nvPr>
+            <p:ph type="body" idx="1"/>
+          </p:nvPr>
+        </p:nvSpPr>
+        <p:spPr/>
+        <p:txBody>
+          <a:bodyPr/>
+          <a:lstStyle/>
+          <a:p>
+            <a:r>
+              <a:rPr lang="en-US" dirty="0"/>
+              <a:t>What is Privacy?</a:t>
+            </a:r>
+          </a:p>
+          <a:p>
+            <a:endParaRPr lang="en-US" dirty="0"/>
+          </a:p>
+          <a:p>
+            <a:r>
+              <a:rPr lang="en-US" dirty="0"/>
+              <a:t>Cambridge dictionary: “someone's right to keep their personal matters and relationships secret”</a:t>
+            </a:r>
+          </a:p>
+          <a:p>
+            <a:endParaRPr lang="en-US" dirty="0"/>
+          </a:p>
+          <a:p>
+            <a:r>
+              <a:rPr lang="en-US" dirty="0"/>
+              <a:t>It’s a collection of anything that could be used to identify you, or something about you</a:t>
+            </a:r>
+          </a:p>
+          <a:p>
+            <a:endParaRPr lang="en-US" dirty="0"/>
+          </a:p>
+          <a:p>
+            <a:r>
+              <a:rPr lang="en-US" dirty="0"/>
+              <a:t>Contacts</a:t>
+            </a:r>
+          </a:p>
+          <a:p>
+            <a:r>
+              <a:rPr lang="en-US" dirty="0"/>
+              <a:t>Location</a:t>
+            </a:r>
+          </a:p>
+          <a:p>
+            <a:r>
+              <a:rPr lang="en-US" dirty="0"/>
+              <a:t>Habits</a:t>
+            </a:r>
+          </a:p>
+          <a:p>
+            <a:r>
+              <a:rPr lang="en-US" dirty="0"/>
+              <a:t>Battery</a:t>
+            </a:r>
+          </a:p>
+        </p:txBody>
+      </p:sp>
+      <p:sp>
+        <p:nvSpPr>
+          <p:cNvPr id="4" name="Slide Number Placeholder 3"/>
+          <p:cNvSpPr>
+            <a:spLocks noGrp="1"/>
+          </p:cNvSpPr>
+          <p:nvPr>
+            <p:ph type="sldNum" sz="quarter" idx="5"/>
+          </p:nvPr>
+        </p:nvSpPr>
+        <p:spPr/>
+        <p:txBody>
+          <a:bodyPr/>
+          <a:lstStyle/>
+          <a:p>
+            <a:fld id="{96DA3624-76B2-9B40-BE05-B95AD43EDBF4}" type="slidenum">
+              <a:rPr lang="en-US" smtClean="0"/>
+              <a:t>3</a:t>
+            </a:fld>
+            <a:endParaRPr lang="en-US"/>
+          </a:p>
+        </p:txBody>
+      </p:sp>
+    </p:spTree>
+    <p:extLst>
+      <p:ext uri="{BB962C8B-B14F-4D97-AF65-F5344CB8AC3E}">
+        <p14:creationId xmlns:p14="http://schemas.microsoft.com/office/powerpoint/2010/main" val="1831012302"/>
+      </p:ext>
+    </p:extLst>
+  </p:cSld>
+  <p:clrMapOvr>
+    <a:masterClrMapping/>
+  </p:clrMapOvr>
+</p:notes>
+</file>
+
+<file path=ppt/notesSlides/notesSlide4.xml><?xml version="1.0" encoding="utf-8"?>
+<p:notes xmlns:a="http://schemas.openxmlformats.org/drawingml/2006/main" xmlns:r="http://schemas.openxmlformats.org/officeDocument/2006/relationships" xmlns:p="http://schemas.openxmlformats.org/presentationml/2006/main">
+  <p:cSld>
+    <p:spTree>
+      <p:nvGrpSpPr>
+        <p:cNvPr id="1" name=""/>
+        <p:cNvGrpSpPr/>
+        <p:nvPr/>
+      </p:nvGrpSpPr>
+      <p:grpSpPr>
+        <a:xfrm>
+          <a:off x="0" y="0"/>
+          <a:ext cx="0" cy="0"/>
+          <a:chOff x="0" y="0"/>
+          <a:chExt cx="0" cy="0"/>
+        </a:xfrm>
+      </p:grpSpPr>
+      <p:sp>
+        <p:nvSpPr>
+          <p:cNvPr id="2" name="Slide Image Placeholder 1"/>
+          <p:cNvSpPr>
+            <a:spLocks noGrp="1" noRot="1" noChangeAspect="1"/>
+          </p:cNvSpPr>
+          <p:nvPr>
+            <p:ph type="sldImg"/>
+          </p:nvPr>
+        </p:nvSpPr>
+        <p:spPr/>
+      </p:sp>
+      <p:sp>
+        <p:nvSpPr>
+          <p:cNvPr id="3" name="Notes Placeholder 2"/>
+          <p:cNvSpPr>
+            <a:spLocks noGrp="1"/>
+          </p:cNvSpPr>
+          <p:nvPr>
+            <p:ph type="body" idx="1"/>
+          </p:nvPr>
+        </p:nvSpPr>
+        <p:spPr/>
+        <p:txBody>
+          <a:bodyPr/>
+          <a:lstStyle/>
+          <a:p>
+            <a:r>
+              <a:rPr lang="en-US" dirty="0"/>
+              <a:t>Some common misconceptions about privacy</a:t>
+            </a:r>
+          </a:p>
+          <a:p>
+            <a:endParaRPr lang="en-US" dirty="0"/>
+          </a:p>
+          <a:p>
+            <a:pPr marL="171450" indent="-171450">
+              <a:buFontTx/>
+              <a:buChar char="-"/>
+            </a:pPr>
+            <a:r>
+              <a:rPr lang="en-US" dirty="0"/>
+              <a:t>We don’t have privacy</a:t>
+            </a:r>
+          </a:p>
+          <a:p>
+            <a:pPr marL="171450" indent="-171450">
+              <a:buFontTx/>
+              <a:buChar char="-"/>
+            </a:pPr>
+            <a:r>
+              <a:rPr lang="en-US" dirty="0"/>
+              <a:t>I’m not interesting enough</a:t>
+            </a:r>
+          </a:p>
+        </p:txBody>
+      </p:sp>
+      <p:sp>
+        <p:nvSpPr>
+          <p:cNvPr id="4" name="Slide Number Placeholder 3"/>
+          <p:cNvSpPr>
+            <a:spLocks noGrp="1"/>
+          </p:cNvSpPr>
+          <p:nvPr>
+            <p:ph type="sldNum" sz="quarter" idx="5"/>
+          </p:nvPr>
+        </p:nvSpPr>
+        <p:spPr/>
+        <p:txBody>
+          <a:bodyPr/>
+          <a:lstStyle/>
+          <a:p>
+            <a:fld id="{96DA3624-76B2-9B40-BE05-B95AD43EDBF4}" type="slidenum">
+              <a:rPr lang="en-US" smtClean="0"/>
+              <a:t>4</a:t>
+            </a:fld>
+            <a:endParaRPr lang="en-US"/>
+          </a:p>
+        </p:txBody>
+      </p:sp>
+    </p:spTree>
+    <p:extLst>
+      <p:ext uri="{BB962C8B-B14F-4D97-AF65-F5344CB8AC3E}">
+        <p14:creationId xmlns:p14="http://schemas.microsoft.com/office/powerpoint/2010/main" val="1677436798"/>
+      </p:ext>
+    </p:extLst>
+  </p:cSld>
+  <p:clrMapOvr>
+    <a:masterClrMapping/>
+  </p:clrMapOvr>
+</p:notes>
+</file>
+
+<file path=ppt/notesSlides/notesSlide5.xml><?xml version="1.0" encoding="utf-8"?>
+<p:notes xmlns:a="http://schemas.openxmlformats.org/drawingml/2006/main" xmlns:r="http://schemas.openxmlformats.org/officeDocument/2006/relationships" xmlns:p="http://schemas.openxmlformats.org/presentationml/2006/main">
+  <p:cSld>
+    <p:spTree>
+      <p:nvGrpSpPr>
+        <p:cNvPr id="1" name=""/>
+        <p:cNvGrpSpPr/>
+        <p:nvPr/>
+      </p:nvGrpSpPr>
+      <p:grpSpPr>
+        <a:xfrm>
+          <a:off x="0" y="0"/>
+          <a:ext cx="0" cy="0"/>
+          <a:chOff x="0" y="0"/>
+          <a:chExt cx="0" cy="0"/>
+        </a:xfrm>
+      </p:grpSpPr>
+      <p:sp>
+        <p:nvSpPr>
+          <p:cNvPr id="2" name="Slide Image Placeholder 1"/>
+          <p:cNvSpPr>
+            <a:spLocks noGrp="1" noRot="1" noChangeAspect="1"/>
+          </p:cNvSpPr>
+          <p:nvPr>
+            <p:ph type="sldImg"/>
+          </p:nvPr>
+        </p:nvSpPr>
+        <p:spPr/>
+      </p:sp>
+      <p:sp>
+        <p:nvSpPr>
+          <p:cNvPr id="3" name="Notes Placeholder 2"/>
+          <p:cNvSpPr>
+            <a:spLocks noGrp="1"/>
+          </p:cNvSpPr>
+          <p:nvPr>
+            <p:ph type="body" idx="1"/>
+          </p:nvPr>
+        </p:nvSpPr>
+        <p:spPr/>
+        <p:txBody>
+          <a:bodyPr/>
+          <a:lstStyle/>
+          <a:p>
+            <a:r>
+              <a:rPr lang="en-US" dirty="0"/>
+              <a:t>Comparing privacy and wearing a mask in a pandemic</a:t>
+            </a:r>
+          </a:p>
+        </p:txBody>
+      </p:sp>
+      <p:sp>
+        <p:nvSpPr>
+          <p:cNvPr id="4" name="Slide Number Placeholder 3"/>
+          <p:cNvSpPr>
+            <a:spLocks noGrp="1"/>
+          </p:cNvSpPr>
+          <p:nvPr>
+            <p:ph type="sldNum" sz="quarter" idx="5"/>
+          </p:nvPr>
+        </p:nvSpPr>
+        <p:spPr/>
+        <p:txBody>
+          <a:bodyPr/>
+          <a:lstStyle/>
+          <a:p>
+            <a:fld id="{96DA3624-76B2-9B40-BE05-B95AD43EDBF4}" type="slidenum">
+              <a:rPr lang="en-US" smtClean="0"/>
+              <a:t>5</a:t>
+            </a:fld>
+            <a:endParaRPr lang="en-US"/>
+          </a:p>
+        </p:txBody>
+      </p:sp>
+    </p:spTree>
+    <p:extLst>
+      <p:ext uri="{BB962C8B-B14F-4D97-AF65-F5344CB8AC3E}">
+        <p14:creationId xmlns:p14="http://schemas.microsoft.com/office/powerpoint/2010/main" val="189427727"/>
+      </p:ext>
+    </p:extLst>
+  </p:cSld>
+  <p:clrMapOvr>
+    <a:masterClrMapping/>
+  </p:clrMapOvr>
+</p:notes>
+</file>
+
+<file path=ppt/notesSlides/notesSlide6.xml><?xml version="1.0" encoding="utf-8"?>
+<p:notes xmlns:a="http://schemas.openxmlformats.org/drawingml/2006/main" xmlns:r="http://schemas.openxmlformats.org/officeDocument/2006/relationships" xmlns:p="http://schemas.openxmlformats.org/presentationml/2006/main">
+  <p:cSld>
+    <p:spTree>
+      <p:nvGrpSpPr>
+        <p:cNvPr id="1" name=""/>
+        <p:cNvGrpSpPr/>
+        <p:nvPr/>
+      </p:nvGrpSpPr>
+      <p:grpSpPr>
+        <a:xfrm>
+          <a:off x="0" y="0"/>
+          <a:ext cx="0" cy="0"/>
+          <a:chOff x="0" y="0"/>
+          <a:chExt cx="0" cy="0"/>
+        </a:xfrm>
+      </p:grpSpPr>
+      <p:sp>
+        <p:nvSpPr>
+          <p:cNvPr id="2" name="Slide Image Placeholder 1"/>
+          <p:cNvSpPr>
+            <a:spLocks noGrp="1" noRot="1" noChangeAspect="1"/>
+          </p:cNvSpPr>
+          <p:nvPr>
+            <p:ph type="sldImg"/>
+          </p:nvPr>
+        </p:nvSpPr>
+        <p:spPr/>
+      </p:sp>
+      <p:sp>
+        <p:nvSpPr>
+          <p:cNvPr id="3" name="Notes Placeholder 2"/>
+          <p:cNvSpPr>
+            <a:spLocks noGrp="1"/>
+          </p:cNvSpPr>
+          <p:nvPr>
+            <p:ph type="body" idx="1"/>
+          </p:nvPr>
+        </p:nvSpPr>
+        <p:spPr/>
+        <p:txBody>
+          <a:bodyPr/>
+          <a:lstStyle/>
+          <a:p>
+            <a:r>
+              <a:rPr lang="en-US" dirty="0"/>
+              <a:t>Android apps have a very neat feature known as a manifest file. This file is a record of every screen in an app, as well as any “broadcast receiver” – which we all know as a subscriber in a publish subscribe model. There are three types of broadcast in an Android app</a:t>
+            </a:r>
+          </a:p>
+          <a:p>
+            <a:pPr marL="171450" indent="-171450">
+              <a:buFontTx/>
+              <a:buChar char="-"/>
+            </a:pPr>
+            <a:r>
+              <a:rPr lang="en-US" dirty="0"/>
+              <a:t>System global</a:t>
+            </a:r>
+          </a:p>
+          <a:p>
+            <a:pPr marL="171450" indent="-171450">
+              <a:buFontTx/>
+              <a:buChar char="-"/>
+            </a:pPr>
+            <a:r>
+              <a:rPr lang="en-US" dirty="0"/>
+              <a:t>App global</a:t>
+            </a:r>
+          </a:p>
+          <a:p>
+            <a:pPr marL="171450" indent="-171450">
+              <a:buFontTx/>
+              <a:buChar char="-"/>
+            </a:pPr>
+            <a:r>
+              <a:rPr lang="en-US" dirty="0"/>
+              <a:t>App local</a:t>
+            </a:r>
+          </a:p>
+          <a:p>
+            <a:pPr marL="171450" indent="-171450">
+              <a:buFontTx/>
+              <a:buChar char="-"/>
+            </a:pPr>
+            <a:endParaRPr lang="en-US" dirty="0"/>
+          </a:p>
+          <a:p>
+            <a:pPr marL="0" indent="0">
+              <a:buFontTx/>
+              <a:buNone/>
+            </a:pPr>
+            <a:r>
+              <a:rPr lang="en-US" dirty="0"/>
+              <a:t>These can be used </a:t>
+            </a:r>
+          </a:p>
+        </p:txBody>
+      </p:sp>
+      <p:sp>
+        <p:nvSpPr>
+          <p:cNvPr id="4" name="Slide Number Placeholder 3"/>
+          <p:cNvSpPr>
+            <a:spLocks noGrp="1"/>
+          </p:cNvSpPr>
+          <p:nvPr>
+            <p:ph type="sldNum" sz="quarter" idx="5"/>
+          </p:nvPr>
+        </p:nvSpPr>
+        <p:spPr/>
+        <p:txBody>
+          <a:bodyPr/>
+          <a:lstStyle/>
+          <a:p>
+            <a:fld id="{96DA3624-76B2-9B40-BE05-B95AD43EDBF4}" type="slidenum">
+              <a:rPr lang="en-US" smtClean="0"/>
+              <a:t>6</a:t>
+            </a:fld>
+            <a:endParaRPr lang="en-US"/>
+          </a:p>
+        </p:txBody>
+      </p:sp>
+    </p:spTree>
+    <p:extLst>
+      <p:ext uri="{BB962C8B-B14F-4D97-AF65-F5344CB8AC3E}">
+        <p14:creationId xmlns:p14="http://schemas.microsoft.com/office/powerpoint/2010/main" val="1412527725"/>
+      </p:ext>
+    </p:extLst>
+  </p:cSld>
+  <p:clrMapOvr>
+    <a:masterClrMapping/>
+  </p:clrMapOvr>
+</p:notes>
+</file>
+
+<file path=ppt/notesSlides/notesSlide7.xml><?xml version="1.0" encoding="utf-8"?>
+<p:notes xmlns:a="http://schemas.openxmlformats.org/drawingml/2006/main" xmlns:r="http://schemas.openxmlformats.org/officeDocument/2006/relationships" xmlns:p="http://schemas.openxmlformats.org/presentationml/2006/main">
+  <p:cSld>
+    <p:spTree>
+      <p:nvGrpSpPr>
+        <p:cNvPr id="1" name=""/>
+        <p:cNvGrpSpPr/>
+        <p:nvPr/>
+      </p:nvGrpSpPr>
+      <p:grpSpPr>
+        <a:xfrm>
+          <a:off x="0" y="0"/>
+          <a:ext cx="0" cy="0"/>
+          <a:chOff x="0" y="0"/>
+          <a:chExt cx="0" cy="0"/>
+        </a:xfrm>
+      </p:grpSpPr>
+      <p:sp>
+        <p:nvSpPr>
+          <p:cNvPr id="2" name="Slide Image Placeholder 1"/>
+          <p:cNvSpPr>
+            <a:spLocks noGrp="1" noRot="1" noChangeAspect="1"/>
+          </p:cNvSpPr>
+          <p:nvPr>
+            <p:ph type="sldImg"/>
+          </p:nvPr>
+        </p:nvSpPr>
+        <p:spPr/>
+      </p:sp>
+      <p:sp>
+        <p:nvSpPr>
+          <p:cNvPr id="3" name="Notes Placeholder 2"/>
+          <p:cNvSpPr>
+            <a:spLocks noGrp="1"/>
+          </p:cNvSpPr>
+          <p:nvPr>
+            <p:ph type="body" idx="1"/>
+          </p:nvPr>
+        </p:nvSpPr>
+        <p:spPr/>
+        <p:txBody>
+          <a:bodyPr/>
+          <a:lstStyle/>
+          <a:p>
+            <a:r>
+              <a:rPr lang="en-US" dirty="0"/>
+              <a:t>Battery is one of the most interesting things I have found to be tracked, not just by apps but websites as well.</a:t>
+            </a:r>
+          </a:p>
+          <a:p>
+            <a:endParaRPr lang="en-US" dirty="0"/>
+          </a:p>
+          <a:p>
+            <a:endParaRPr lang="en-US" dirty="0"/>
+          </a:p>
+        </p:txBody>
+      </p:sp>
+      <p:sp>
+        <p:nvSpPr>
+          <p:cNvPr id="4" name="Slide Number Placeholder 3"/>
+          <p:cNvSpPr>
+            <a:spLocks noGrp="1"/>
+          </p:cNvSpPr>
+          <p:nvPr>
+            <p:ph type="sldNum" sz="quarter" idx="5"/>
+          </p:nvPr>
+        </p:nvSpPr>
+        <p:spPr/>
+        <p:txBody>
+          <a:bodyPr/>
+          <a:lstStyle/>
+          <a:p>
+            <a:fld id="{96DA3624-76B2-9B40-BE05-B95AD43EDBF4}" type="slidenum">
+              <a:rPr lang="en-US" smtClean="0"/>
+              <a:t>8</a:t>
+            </a:fld>
+            <a:endParaRPr lang="en-US"/>
+          </a:p>
+        </p:txBody>
+      </p:sp>
+    </p:spTree>
+    <p:extLst>
+      <p:ext uri="{BB962C8B-B14F-4D97-AF65-F5344CB8AC3E}">
+        <p14:creationId xmlns:p14="http://schemas.microsoft.com/office/powerpoint/2010/main" val="841058909"/>
+      </p:ext>
+    </p:extLst>
+  </p:cSld>
+  <p:clrMapOvr>
+    <a:masterClrMapping/>
+  </p:clrMapOvr>
+</p:notes>
 </file>
 
 <file path=ppt/slideLayouts/slideLayout1.xml><?xml version="1.0" encoding="utf-8"?>
@@ -321,7 +1469,7 @@
             <a:fld id="{B61BEF0D-F0BB-DE4B-95CE-6DB70DBA9567}" type="datetimeFigureOut">
               <a:rPr lang="en-US" dirty="0"/>
               <a:pPr/>
-              <a:t>2/9/21</a:t>
+              <a:t>3/1/21</a:t>
             </a:fld>
             <a:endParaRPr lang="en-US" dirty="0"/>
           </a:p>
@@ -609,7 +1757,7 @@
             <a:fld id="{B61BEF0D-F0BB-DE4B-95CE-6DB70DBA9567}" type="datetimeFigureOut">
               <a:rPr lang="en-US" dirty="0"/>
               <a:pPr/>
-              <a:t>2/9/21</a:t>
+              <a:t>3/1/21</a:t>
             </a:fld>
             <a:endParaRPr lang="en-US" dirty="0"/>
           </a:p>
@@ -865,7 +2013,7 @@
             <a:fld id="{B61BEF0D-F0BB-DE4B-95CE-6DB70DBA9567}" type="datetimeFigureOut">
               <a:rPr lang="en-US" dirty="0"/>
               <a:pPr/>
-              <a:t>2/9/21</a:t>
+              <a:t>3/1/21</a:t>
             </a:fld>
             <a:endParaRPr lang="en-US" dirty="0"/>
           </a:p>
@@ -1331,7 +2479,7 @@
             <a:fld id="{B61BEF0D-F0BB-DE4B-95CE-6DB70DBA9567}" type="datetimeFigureOut">
               <a:rPr lang="en-US" dirty="0"/>
               <a:pPr/>
-              <a:t>2/9/21</a:t>
+              <a:t>3/1/21</a:t>
             </a:fld>
             <a:endParaRPr lang="en-US" dirty="0"/>
           </a:p>
@@ -1508,7 +2656,7 @@
             <a:fld id="{B61BEF0D-F0BB-DE4B-95CE-6DB70DBA9567}" type="datetimeFigureOut">
               <a:rPr lang="en-US" dirty="0"/>
               <a:pPr/>
-              <a:t>2/9/21</a:t>
+              <a:t>3/1/21</a:t>
             </a:fld>
             <a:endParaRPr lang="en-US" dirty="0"/>
           </a:p>
@@ -2081,7 +3229,7 @@
             <a:fld id="{B61BEF0D-F0BB-DE4B-95CE-6DB70DBA9567}" type="datetimeFigureOut">
               <a:rPr lang="en-US" dirty="0"/>
               <a:pPr/>
-              <a:t>2/9/21</a:t>
+              <a:t>3/1/21</a:t>
             </a:fld>
             <a:endParaRPr lang="en-US" dirty="0"/>
           </a:p>
@@ -2410,7 +3558,7 @@
             <a:fld id="{B61BEF0D-F0BB-DE4B-95CE-6DB70DBA9567}" type="datetimeFigureOut">
               <a:rPr lang="en-US" dirty="0"/>
               <a:pPr/>
-              <a:t>2/9/21</a:t>
+              <a:t>3/1/21</a:t>
             </a:fld>
             <a:endParaRPr lang="en-US" dirty="0"/>
           </a:p>
@@ -2582,7 +3730,7 @@
             <a:fld id="{B61BEF0D-F0BB-DE4B-95CE-6DB70DBA9567}" type="datetimeFigureOut">
               <a:rPr lang="en-US" dirty="0"/>
               <a:pPr/>
-              <a:t>2/9/21</a:t>
+              <a:t>3/1/21</a:t>
             </a:fld>
             <a:endParaRPr lang="en-US" dirty="0"/>
           </a:p>
@@ -2759,7 +3907,7 @@
             <a:fld id="{B61BEF0D-F0BB-DE4B-95CE-6DB70DBA9567}" type="datetimeFigureOut">
               <a:rPr lang="en-US" dirty="0"/>
               <a:pPr/>
-              <a:t>2/9/21</a:t>
+              <a:t>3/1/21</a:t>
             </a:fld>
             <a:endParaRPr lang="en-US" dirty="0"/>
           </a:p>
@@ -2926,7 +4074,7 @@
             <a:fld id="{B61BEF0D-F0BB-DE4B-95CE-6DB70DBA9567}" type="datetimeFigureOut">
               <a:rPr lang="en-US" dirty="0"/>
               <a:pPr/>
-              <a:t>2/9/21</a:t>
+              <a:t>3/1/21</a:t>
             </a:fld>
             <a:endParaRPr lang="en-US" dirty="0"/>
           </a:p>
@@ -3180,7 +4328,7 @@
             <a:fld id="{B61BEF0D-F0BB-DE4B-95CE-6DB70DBA9567}" type="datetimeFigureOut">
               <a:rPr lang="en-US" dirty="0"/>
               <a:pPr/>
-              <a:t>2/9/21</a:t>
+              <a:t>3/1/21</a:t>
             </a:fld>
             <a:endParaRPr lang="en-US" dirty="0"/>
           </a:p>
@@ -3469,7 +4617,7 @@
             <a:fld id="{B61BEF0D-F0BB-DE4B-95CE-6DB70DBA9567}" type="datetimeFigureOut">
               <a:rPr lang="en-US" dirty="0"/>
               <a:pPr/>
-              <a:t>2/9/21</a:t>
+              <a:t>3/1/21</a:t>
             </a:fld>
             <a:endParaRPr lang="en-US" dirty="0"/>
           </a:p>
@@ -3896,7 +5044,7 @@
             <a:fld id="{B61BEF0D-F0BB-DE4B-95CE-6DB70DBA9567}" type="datetimeFigureOut">
               <a:rPr lang="en-US" dirty="0"/>
               <a:pPr/>
-              <a:t>2/9/21</a:t>
+              <a:t>3/1/21</a:t>
             </a:fld>
             <a:endParaRPr lang="en-US" dirty="0"/>
           </a:p>
@@ -4011,7 +5159,7 @@
             <a:fld id="{B61BEF0D-F0BB-DE4B-95CE-6DB70DBA9567}" type="datetimeFigureOut">
               <a:rPr lang="en-US" dirty="0"/>
               <a:pPr/>
-              <a:t>2/9/21</a:t>
+              <a:t>3/1/21</a:t>
             </a:fld>
             <a:endParaRPr lang="en-US" dirty="0"/>
           </a:p>
@@ -4103,7 +5251,7 @@
             <a:fld id="{B61BEF0D-F0BB-DE4B-95CE-6DB70DBA9567}" type="datetimeFigureOut">
               <a:rPr lang="en-US" dirty="0"/>
               <a:pPr/>
-              <a:t>2/9/21</a:t>
+              <a:t>3/1/21</a:t>
             </a:fld>
             <a:endParaRPr lang="en-US" dirty="0"/>
           </a:p>
@@ -4383,7 +5531,7 @@
             <a:fld id="{B61BEF0D-F0BB-DE4B-95CE-6DB70DBA9567}" type="datetimeFigureOut">
               <a:rPr lang="en-US" dirty="0"/>
               <a:pPr/>
-              <a:t>2/9/21</a:t>
+              <a:t>3/1/21</a:t>
             </a:fld>
             <a:endParaRPr lang="en-US" dirty="0"/>
           </a:p>
@@ -4671,7 +5819,7 @@
             <a:fld id="{B61BEF0D-F0BB-DE4B-95CE-6DB70DBA9567}" type="datetimeFigureOut">
               <a:rPr lang="en-US" dirty="0"/>
               <a:pPr/>
-              <a:t>2/9/21</a:t>
+              <a:t>3/1/21</a:t>
             </a:fld>
             <a:endParaRPr lang="en-US" dirty="0"/>
           </a:p>
@@ -4899,7 +6047,7 @@
             <a:fld id="{B61BEF0D-F0BB-DE4B-95CE-6DB70DBA9567}" type="datetimeFigureOut">
               <a:rPr lang="en-US" dirty="0"/>
               <a:pPr/>
-              <a:t>2/9/21</a:t>
+              <a:t>3/1/21</a:t>
             </a:fld>
             <a:endParaRPr lang="en-US" dirty="0"/>
           </a:p>
@@ -5653,7 +6801,7 @@
     <p:bg>
       <p:bgPr>
         <a:blipFill rotWithShape="1">
-          <a:blip r:embed="rId2">
+          <a:blip r:embed="rId3">
             <a:duotone>
               <a:schemeClr val="bg2">
                 <a:shade val="28000"/>
@@ -5774,10 +6922,10 @@
           <p:nvPr/>
         </p:nvPicPr>
         <p:blipFill>
-          <a:blip r:embed="rId3">
+          <a:blip r:embed="rId4">
             <a:extLst>
               <a:ext uri="{96DAC541-7B7A-43D3-8B79-37D633B846F1}">
-                <asvg:svgBlip xmlns:asvg="http://schemas.microsoft.com/office/drawing/2016/SVG/main" r:embed="rId4"/>
+                <asvg:svgBlip xmlns:asvg="http://schemas.microsoft.com/office/drawing/2016/SVG/main" r:embed="rId5"/>
               </a:ext>
             </a:extLst>
           </a:blip>
@@ -5824,6 +6972,1285 @@
     <p:extLst>
       <p:ext uri="{BB962C8B-B14F-4D97-AF65-F5344CB8AC3E}">
         <p14:creationId xmlns:p14="http://schemas.microsoft.com/office/powerpoint/2010/main" val="4187862107"/>
+      </p:ext>
+    </p:extLst>
+  </p:cSld>
+  <p:clrMapOvr>
+    <a:masterClrMapping/>
+  </p:clrMapOvr>
+</p:sld>
+</file>
+
+<file path=ppt/slides/slide2.xml><?xml version="1.0" encoding="utf-8"?>
+<p:sld xmlns:a="http://schemas.openxmlformats.org/drawingml/2006/main" xmlns:r="http://schemas.openxmlformats.org/officeDocument/2006/relationships" xmlns:p="http://schemas.openxmlformats.org/presentationml/2006/main">
+  <p:cSld>
+    <p:spTree>
+      <p:nvGrpSpPr>
+        <p:cNvPr id="1" name=""/>
+        <p:cNvGrpSpPr/>
+        <p:nvPr/>
+      </p:nvGrpSpPr>
+      <p:grpSpPr>
+        <a:xfrm>
+          <a:off x="0" y="0"/>
+          <a:ext cx="0" cy="0"/>
+          <a:chOff x="0" y="0"/>
+          <a:chExt cx="0" cy="0"/>
+        </a:xfrm>
+      </p:grpSpPr>
+      <p:pic>
+        <p:nvPicPr>
+          <p:cNvPr id="5" name="Picture 4" descr="Icon&#10;&#10;Description automatically generated">
+            <a:extLst>
+              <a:ext uri="{FF2B5EF4-FFF2-40B4-BE49-F238E27FC236}">
+                <a16:creationId xmlns:a16="http://schemas.microsoft.com/office/drawing/2014/main" id="{8598199F-41E7-E440-9220-52AA122D4778}"/>
+              </a:ext>
+            </a:extLst>
+          </p:cNvPr>
+          <p:cNvPicPr>
+            <a:picLocks noChangeAspect="1"/>
+          </p:cNvPicPr>
+          <p:nvPr/>
+        </p:nvPicPr>
+        <p:blipFill>
+          <a:blip r:embed="rId3"/>
+          <a:stretch>
+            <a:fillRect/>
+          </a:stretch>
+        </p:blipFill>
+        <p:spPr>
+          <a:xfrm>
+            <a:off x="3498850" y="831850"/>
+            <a:ext cx="5194300" cy="5194300"/>
+          </a:xfrm>
+          <a:prstGeom prst="rect">
+            <a:avLst/>
+          </a:prstGeom>
+        </p:spPr>
+      </p:pic>
+    </p:spTree>
+    <p:extLst>
+      <p:ext uri="{BB962C8B-B14F-4D97-AF65-F5344CB8AC3E}">
+        <p14:creationId xmlns:p14="http://schemas.microsoft.com/office/powerpoint/2010/main" val="4205937143"/>
+      </p:ext>
+    </p:extLst>
+  </p:cSld>
+  <p:clrMapOvr>
+    <a:masterClrMapping/>
+  </p:clrMapOvr>
+</p:sld>
+</file>
+
+<file path=ppt/slides/slide3.xml><?xml version="1.0" encoding="utf-8"?>
+<p:sld xmlns:a="http://schemas.openxmlformats.org/drawingml/2006/main" xmlns:r="http://schemas.openxmlformats.org/officeDocument/2006/relationships" xmlns:p="http://schemas.openxmlformats.org/presentationml/2006/main">
+  <p:cSld>
+    <p:spTree>
+      <p:nvGrpSpPr>
+        <p:cNvPr id="1" name=""/>
+        <p:cNvGrpSpPr/>
+        <p:nvPr/>
+      </p:nvGrpSpPr>
+      <p:grpSpPr>
+        <a:xfrm>
+          <a:off x="0" y="0"/>
+          <a:ext cx="0" cy="0"/>
+          <a:chOff x="0" y="0"/>
+          <a:chExt cx="0" cy="0"/>
+        </a:xfrm>
+      </p:grpSpPr>
+      <p:pic>
+        <p:nvPicPr>
+          <p:cNvPr id="5" name="Picture 4" descr="Shape&#10;&#10;Description automatically generated with low confidence">
+            <a:extLst>
+              <a:ext uri="{FF2B5EF4-FFF2-40B4-BE49-F238E27FC236}">
+                <a16:creationId xmlns:a16="http://schemas.microsoft.com/office/drawing/2014/main" id="{F37C8A82-CD5C-DD40-A920-AACD2A552242}"/>
+              </a:ext>
+            </a:extLst>
+          </p:cNvPr>
+          <p:cNvPicPr>
+            <a:picLocks noChangeAspect="1"/>
+          </p:cNvPicPr>
+          <p:nvPr/>
+        </p:nvPicPr>
+        <p:blipFill>
+          <a:blip r:embed="rId3">
+            <a:extLst>
+              <a:ext uri="{BEBA8EAE-BF5A-486C-A8C5-ECC9F3942E4B}">
+                <a14:imgProps xmlns:a14="http://schemas.microsoft.com/office/drawing/2010/main">
+                  <a14:imgLayer r:embed="rId4">
+                    <a14:imgEffect>
+                      <a14:artisticPhotocopy/>
+                    </a14:imgEffect>
+                  </a14:imgLayer>
+                </a14:imgProps>
+              </a:ext>
+            </a:extLst>
+          </a:blip>
+          <a:stretch>
+            <a:fillRect/>
+          </a:stretch>
+        </p:blipFill>
+        <p:spPr>
+          <a:xfrm>
+            <a:off x="4697372" y="2150671"/>
+            <a:ext cx="2737282" cy="2737282"/>
+          </a:xfrm>
+          <a:prstGeom prst="rect">
+            <a:avLst/>
+          </a:prstGeom>
+        </p:spPr>
+      </p:pic>
+      <p:pic>
+        <p:nvPicPr>
+          <p:cNvPr id="15" name="Picture 14" descr="Icon&#10;&#10;Description automatically generated">
+            <a:extLst>
+              <a:ext uri="{FF2B5EF4-FFF2-40B4-BE49-F238E27FC236}">
+                <a16:creationId xmlns:a16="http://schemas.microsoft.com/office/drawing/2014/main" id="{B2CE0CB6-D8A2-3E4A-AEA2-28AC1223378D}"/>
+              </a:ext>
+            </a:extLst>
+          </p:cNvPr>
+          <p:cNvPicPr>
+            <a:picLocks noChangeAspect="1"/>
+          </p:cNvPicPr>
+          <p:nvPr/>
+        </p:nvPicPr>
+        <p:blipFill>
+          <a:blip r:embed="rId5"/>
+          <a:stretch>
+            <a:fillRect/>
+          </a:stretch>
+        </p:blipFill>
+        <p:spPr>
+          <a:xfrm>
+            <a:off x="677333" y="2288823"/>
+            <a:ext cx="2460977" cy="2460977"/>
+          </a:xfrm>
+          <a:prstGeom prst="rect">
+            <a:avLst/>
+          </a:prstGeom>
+        </p:spPr>
+      </p:pic>
+      <p:pic>
+        <p:nvPicPr>
+          <p:cNvPr id="17" name="Picture 16" descr="Icon&#10;&#10;Description automatically generated">
+            <a:extLst>
+              <a:ext uri="{FF2B5EF4-FFF2-40B4-BE49-F238E27FC236}">
+                <a16:creationId xmlns:a16="http://schemas.microsoft.com/office/drawing/2014/main" id="{3A706042-042F-FE4C-8044-E91CEB8B2600}"/>
+              </a:ext>
+            </a:extLst>
+          </p:cNvPr>
+          <p:cNvPicPr>
+            <a:picLocks noChangeAspect="1"/>
+          </p:cNvPicPr>
+          <p:nvPr/>
+        </p:nvPicPr>
+        <p:blipFill>
+          <a:blip r:embed="rId6"/>
+          <a:stretch>
+            <a:fillRect/>
+          </a:stretch>
+        </p:blipFill>
+        <p:spPr>
+          <a:xfrm>
+            <a:off x="9237131" y="1502970"/>
+            <a:ext cx="1295401" cy="1295401"/>
+          </a:xfrm>
+          <a:prstGeom prst="rect">
+            <a:avLst/>
+          </a:prstGeom>
+        </p:spPr>
+      </p:pic>
+      <p:pic>
+        <p:nvPicPr>
+          <p:cNvPr id="19" name="Picture 18" descr="Icon&#10;&#10;Description automatically generated">
+            <a:extLst>
+              <a:ext uri="{FF2B5EF4-FFF2-40B4-BE49-F238E27FC236}">
+                <a16:creationId xmlns:a16="http://schemas.microsoft.com/office/drawing/2014/main" id="{0CBDFB8A-A7CA-2747-8A7B-A736D2DE89B7}"/>
+              </a:ext>
+            </a:extLst>
+          </p:cNvPr>
+          <p:cNvPicPr>
+            <a:picLocks noChangeAspect="1"/>
+          </p:cNvPicPr>
+          <p:nvPr/>
+        </p:nvPicPr>
+        <p:blipFill>
+          <a:blip r:embed="rId7"/>
+          <a:stretch>
+            <a:fillRect/>
+          </a:stretch>
+        </p:blipFill>
+        <p:spPr>
+          <a:xfrm>
+            <a:off x="6911596" y="362171"/>
+            <a:ext cx="1441230" cy="1441230"/>
+          </a:xfrm>
+          <a:prstGeom prst="rect">
+            <a:avLst/>
+          </a:prstGeom>
+        </p:spPr>
+      </p:pic>
+      <p:pic>
+        <p:nvPicPr>
+          <p:cNvPr id="21" name="Picture 20" descr="Icon&#10;&#10;Description automatically generated">
+            <a:extLst>
+              <a:ext uri="{FF2B5EF4-FFF2-40B4-BE49-F238E27FC236}">
+                <a16:creationId xmlns:a16="http://schemas.microsoft.com/office/drawing/2014/main" id="{830F6D40-59F5-E84E-88AD-16AFF83FB89C}"/>
+              </a:ext>
+            </a:extLst>
+          </p:cNvPr>
+          <p:cNvPicPr>
+            <a:picLocks noChangeAspect="1"/>
+          </p:cNvPicPr>
+          <p:nvPr/>
+        </p:nvPicPr>
+        <p:blipFill>
+          <a:blip r:embed="rId8"/>
+          <a:stretch>
+            <a:fillRect/>
+          </a:stretch>
+        </p:blipFill>
+        <p:spPr>
+          <a:xfrm>
+            <a:off x="8352826" y="5200428"/>
+            <a:ext cx="1295401" cy="1295401"/>
+          </a:xfrm>
+          <a:prstGeom prst="rect">
+            <a:avLst/>
+          </a:prstGeom>
+        </p:spPr>
+      </p:pic>
+      <p:pic>
+        <p:nvPicPr>
+          <p:cNvPr id="23" name="Picture 22" descr="Icon&#10;&#10;Description automatically generated">
+            <a:extLst>
+              <a:ext uri="{FF2B5EF4-FFF2-40B4-BE49-F238E27FC236}">
+                <a16:creationId xmlns:a16="http://schemas.microsoft.com/office/drawing/2014/main" id="{2E5DD08C-93C7-484A-A9CD-EBA0A33AA500}"/>
+              </a:ext>
+            </a:extLst>
+          </p:cNvPr>
+          <p:cNvPicPr>
+            <a:picLocks noChangeAspect="1"/>
+          </p:cNvPicPr>
+          <p:nvPr/>
+        </p:nvPicPr>
+        <p:blipFill>
+          <a:blip r:embed="rId9"/>
+          <a:stretch>
+            <a:fillRect/>
+          </a:stretch>
+        </p:blipFill>
+        <p:spPr>
+          <a:xfrm>
+            <a:off x="9460088" y="3045177"/>
+            <a:ext cx="1704623" cy="1704623"/>
+          </a:xfrm>
+          <a:prstGeom prst="rect">
+            <a:avLst/>
+          </a:prstGeom>
+        </p:spPr>
+      </p:pic>
+    </p:spTree>
+    <p:extLst>
+      <p:ext uri="{BB962C8B-B14F-4D97-AF65-F5344CB8AC3E}">
+        <p14:creationId xmlns:p14="http://schemas.microsoft.com/office/powerpoint/2010/main" val="719255780"/>
+      </p:ext>
+    </p:extLst>
+  </p:cSld>
+  <p:clrMapOvr>
+    <a:masterClrMapping/>
+  </p:clrMapOvr>
+</p:sld>
+</file>
+
+<file path=ppt/slides/slide4.xml><?xml version="1.0" encoding="utf-8"?>
+<p:sld xmlns:a="http://schemas.openxmlformats.org/drawingml/2006/main" xmlns:r="http://schemas.openxmlformats.org/officeDocument/2006/relationships" xmlns:p="http://schemas.openxmlformats.org/presentationml/2006/main">
+  <p:cSld>
+    <p:spTree>
+      <p:nvGrpSpPr>
+        <p:cNvPr id="1" name=""/>
+        <p:cNvGrpSpPr/>
+        <p:nvPr/>
+      </p:nvGrpSpPr>
+      <p:grpSpPr>
+        <a:xfrm>
+          <a:off x="0" y="0"/>
+          <a:ext cx="0" cy="0"/>
+          <a:chOff x="0" y="0"/>
+          <a:chExt cx="0" cy="0"/>
+        </a:xfrm>
+      </p:grpSpPr>
+      <p:pic>
+        <p:nvPicPr>
+          <p:cNvPr id="5" name="Picture 4" descr="Shape&#10;&#10;Description automatically generated with low confidence">
+            <a:extLst>
+              <a:ext uri="{FF2B5EF4-FFF2-40B4-BE49-F238E27FC236}">
+                <a16:creationId xmlns:a16="http://schemas.microsoft.com/office/drawing/2014/main" id="{F37C8A82-CD5C-DD40-A920-AACD2A552242}"/>
+              </a:ext>
+            </a:extLst>
+          </p:cNvPr>
+          <p:cNvPicPr>
+            <a:picLocks noChangeAspect="1"/>
+          </p:cNvPicPr>
+          <p:nvPr/>
+        </p:nvPicPr>
+        <p:blipFill>
+          <a:blip r:embed="rId3">
+            <a:extLst>
+              <a:ext uri="{BEBA8EAE-BF5A-486C-A8C5-ECC9F3942E4B}">
+                <a14:imgProps xmlns:a14="http://schemas.microsoft.com/office/drawing/2010/main">
+                  <a14:imgLayer r:embed="rId4">
+                    <a14:imgEffect>
+                      <a14:artisticPhotocopy/>
+                    </a14:imgEffect>
+                  </a14:imgLayer>
+                </a14:imgProps>
+              </a:ext>
+            </a:extLst>
+          </a:blip>
+          <a:stretch>
+            <a:fillRect/>
+          </a:stretch>
+        </p:blipFill>
+        <p:spPr>
+          <a:xfrm>
+            <a:off x="4727359" y="2060359"/>
+            <a:ext cx="2737282" cy="2737282"/>
+          </a:xfrm>
+          <a:prstGeom prst="rect">
+            <a:avLst/>
+          </a:prstGeom>
+        </p:spPr>
+      </p:pic>
+      <p:pic>
+        <p:nvPicPr>
+          <p:cNvPr id="9" name="Picture 8" descr="Logo&#10;&#10;Description automatically generated">
+            <a:extLst>
+              <a:ext uri="{FF2B5EF4-FFF2-40B4-BE49-F238E27FC236}">
+                <a16:creationId xmlns:a16="http://schemas.microsoft.com/office/drawing/2014/main" id="{85096E38-8F63-8349-8C01-126AB5A4C776}"/>
+              </a:ext>
+            </a:extLst>
+          </p:cNvPr>
+          <p:cNvPicPr>
+            <a:picLocks noChangeAspect="1"/>
+          </p:cNvPicPr>
+          <p:nvPr/>
+        </p:nvPicPr>
+        <p:blipFill>
+          <a:blip r:embed="rId5"/>
+          <a:stretch>
+            <a:fillRect/>
+          </a:stretch>
+        </p:blipFill>
+        <p:spPr>
+          <a:xfrm>
+            <a:off x="2994378" y="541867"/>
+            <a:ext cx="1272820" cy="1272820"/>
+          </a:xfrm>
+          <a:prstGeom prst="rect">
+            <a:avLst/>
+          </a:prstGeom>
+        </p:spPr>
+      </p:pic>
+      <p:pic>
+        <p:nvPicPr>
+          <p:cNvPr id="11" name="Picture 10" descr="Logo&#10;&#10;Description automatically generated">
+            <a:extLst>
+              <a:ext uri="{FF2B5EF4-FFF2-40B4-BE49-F238E27FC236}">
+                <a16:creationId xmlns:a16="http://schemas.microsoft.com/office/drawing/2014/main" id="{67D268A4-F142-6E4E-970B-8F288611C13C}"/>
+              </a:ext>
+            </a:extLst>
+          </p:cNvPr>
+          <p:cNvPicPr>
+            <a:picLocks noChangeAspect="1"/>
+          </p:cNvPicPr>
+          <p:nvPr/>
+        </p:nvPicPr>
+        <p:blipFill>
+          <a:blip r:embed="rId6"/>
+          <a:stretch>
+            <a:fillRect/>
+          </a:stretch>
+        </p:blipFill>
+        <p:spPr>
+          <a:xfrm>
+            <a:off x="7924804" y="541867"/>
+            <a:ext cx="1272820" cy="1272820"/>
+          </a:xfrm>
+          <a:prstGeom prst="rect">
+            <a:avLst/>
+          </a:prstGeom>
+        </p:spPr>
+      </p:pic>
+      <p:pic>
+        <p:nvPicPr>
+          <p:cNvPr id="3" name="Picture 2" descr="Icon&#10;&#10;Description automatically generated">
+            <a:extLst>
+              <a:ext uri="{FF2B5EF4-FFF2-40B4-BE49-F238E27FC236}">
+                <a16:creationId xmlns:a16="http://schemas.microsoft.com/office/drawing/2014/main" id="{7A82E701-3EF0-ED48-9919-440B635BFC9F}"/>
+              </a:ext>
+            </a:extLst>
+          </p:cNvPr>
+          <p:cNvPicPr>
+            <a:picLocks noChangeAspect="1"/>
+          </p:cNvPicPr>
+          <p:nvPr/>
+        </p:nvPicPr>
+        <p:blipFill>
+          <a:blip r:embed="rId7"/>
+          <a:stretch>
+            <a:fillRect/>
+          </a:stretch>
+        </p:blipFill>
+        <p:spPr>
+          <a:xfrm>
+            <a:off x="5427201" y="5147733"/>
+            <a:ext cx="1337598" cy="1337598"/>
+          </a:xfrm>
+          <a:prstGeom prst="rect">
+            <a:avLst/>
+          </a:prstGeom>
+        </p:spPr>
+      </p:pic>
+      <p:pic>
+        <p:nvPicPr>
+          <p:cNvPr id="6" name="Picture 5" descr="Logo, icon&#10;&#10;Description automatically generated">
+            <a:extLst>
+              <a:ext uri="{FF2B5EF4-FFF2-40B4-BE49-F238E27FC236}">
+                <a16:creationId xmlns:a16="http://schemas.microsoft.com/office/drawing/2014/main" id="{A478DDD2-36B4-504D-BD09-407E9DEA6F8F}"/>
+              </a:ext>
+            </a:extLst>
+          </p:cNvPr>
+          <p:cNvPicPr>
+            <a:picLocks noChangeAspect="1"/>
+          </p:cNvPicPr>
+          <p:nvPr/>
+        </p:nvPicPr>
+        <p:blipFill>
+          <a:blip r:embed="rId8"/>
+          <a:stretch>
+            <a:fillRect/>
+          </a:stretch>
+        </p:blipFill>
+        <p:spPr>
+          <a:xfrm>
+            <a:off x="2761543" y="414865"/>
+            <a:ext cx="1738490" cy="1738490"/>
+          </a:xfrm>
+          <a:prstGeom prst="rect">
+            <a:avLst/>
+          </a:prstGeom>
+        </p:spPr>
+      </p:pic>
+    </p:spTree>
+    <p:extLst>
+      <p:ext uri="{BB962C8B-B14F-4D97-AF65-F5344CB8AC3E}">
+        <p14:creationId xmlns:p14="http://schemas.microsoft.com/office/powerpoint/2010/main" val="4270045264"/>
+      </p:ext>
+    </p:extLst>
+  </p:cSld>
+  <p:clrMapOvr>
+    <a:masterClrMapping/>
+  </p:clrMapOvr>
+</p:sld>
+</file>
+
+<file path=ppt/slides/slide5.xml><?xml version="1.0" encoding="utf-8"?>
+<p:sld xmlns:a="http://schemas.openxmlformats.org/drawingml/2006/main" xmlns:r="http://schemas.openxmlformats.org/officeDocument/2006/relationships" xmlns:p="http://schemas.openxmlformats.org/presentationml/2006/main">
+  <p:cSld>
+    <p:spTree>
+      <p:nvGrpSpPr>
+        <p:cNvPr id="1" name=""/>
+        <p:cNvGrpSpPr/>
+        <p:nvPr/>
+      </p:nvGrpSpPr>
+      <p:grpSpPr>
+        <a:xfrm>
+          <a:off x="0" y="0"/>
+          <a:ext cx="0" cy="0"/>
+          <a:chOff x="0" y="0"/>
+          <a:chExt cx="0" cy="0"/>
+        </a:xfrm>
+      </p:grpSpPr>
+      <p:pic>
+        <p:nvPicPr>
+          <p:cNvPr id="4" name="Picture 3" descr="Shape&#10;&#10;Description automatically generated with low confidence">
+            <a:extLst>
+              <a:ext uri="{FF2B5EF4-FFF2-40B4-BE49-F238E27FC236}">
+                <a16:creationId xmlns:a16="http://schemas.microsoft.com/office/drawing/2014/main" id="{15113957-664E-8543-BC60-74B6FCFA0032}"/>
+              </a:ext>
+            </a:extLst>
+          </p:cNvPr>
+          <p:cNvPicPr>
+            <a:picLocks noChangeAspect="1"/>
+          </p:cNvPicPr>
+          <p:nvPr/>
+        </p:nvPicPr>
+        <p:blipFill>
+          <a:blip r:embed="rId3">
+            <a:extLst>
+              <a:ext uri="{BEBA8EAE-BF5A-486C-A8C5-ECC9F3942E4B}">
+                <a14:imgProps xmlns:a14="http://schemas.microsoft.com/office/drawing/2010/main">
+                  <a14:imgLayer r:embed="rId4">
+                    <a14:imgEffect>
+                      <a14:artisticPhotocopy/>
+                    </a14:imgEffect>
+                  </a14:imgLayer>
+                </a14:imgProps>
+              </a:ext>
+            </a:extLst>
+          </a:blip>
+          <a:stretch>
+            <a:fillRect/>
+          </a:stretch>
+        </p:blipFill>
+        <p:spPr>
+          <a:xfrm>
+            <a:off x="4727359" y="2060359"/>
+            <a:ext cx="2737282" cy="2737282"/>
+          </a:xfrm>
+          <a:prstGeom prst="rect">
+            <a:avLst/>
+          </a:prstGeom>
+        </p:spPr>
+      </p:pic>
+      <p:pic>
+        <p:nvPicPr>
+          <p:cNvPr id="5" name="Picture 4" descr="Shape&#10;&#10;Description automatically generated with low confidence">
+            <a:extLst>
+              <a:ext uri="{FF2B5EF4-FFF2-40B4-BE49-F238E27FC236}">
+                <a16:creationId xmlns:a16="http://schemas.microsoft.com/office/drawing/2014/main" id="{17E9871D-251B-0D4B-8BB5-784641996A8B}"/>
+              </a:ext>
+            </a:extLst>
+          </p:cNvPr>
+          <p:cNvPicPr>
+            <a:picLocks noChangeAspect="1"/>
+          </p:cNvPicPr>
+          <p:nvPr/>
+        </p:nvPicPr>
+        <p:blipFill>
+          <a:blip r:embed="rId3">
+            <a:extLst>
+              <a:ext uri="{BEBA8EAE-BF5A-486C-A8C5-ECC9F3942E4B}">
+                <a14:imgProps xmlns:a14="http://schemas.microsoft.com/office/drawing/2010/main">
+                  <a14:imgLayer r:embed="rId4">
+                    <a14:imgEffect>
+                      <a14:artisticPhotocopy/>
+                    </a14:imgEffect>
+                  </a14:imgLayer>
+                </a14:imgProps>
+              </a:ext>
+            </a:extLst>
+          </a:blip>
+          <a:stretch>
+            <a:fillRect/>
+          </a:stretch>
+        </p:blipFill>
+        <p:spPr>
+          <a:xfrm>
+            <a:off x="7668768" y="566840"/>
+            <a:ext cx="1386928" cy="1386928"/>
+          </a:xfrm>
+          <a:prstGeom prst="rect">
+            <a:avLst/>
+          </a:prstGeom>
+        </p:spPr>
+      </p:pic>
+      <p:pic>
+        <p:nvPicPr>
+          <p:cNvPr id="8" name="Picture 7" descr="Shape&#10;&#10;Description automatically generated with low confidence">
+            <a:extLst>
+              <a:ext uri="{FF2B5EF4-FFF2-40B4-BE49-F238E27FC236}">
+                <a16:creationId xmlns:a16="http://schemas.microsoft.com/office/drawing/2014/main" id="{BA5681B6-AD81-8D4D-B24A-4B310054334A}"/>
+              </a:ext>
+            </a:extLst>
+          </p:cNvPr>
+          <p:cNvPicPr>
+            <a:picLocks noChangeAspect="1"/>
+          </p:cNvPicPr>
+          <p:nvPr/>
+        </p:nvPicPr>
+        <p:blipFill>
+          <a:blip r:embed="rId3">
+            <a:extLst>
+              <a:ext uri="{BEBA8EAE-BF5A-486C-A8C5-ECC9F3942E4B}">
+                <a14:imgProps xmlns:a14="http://schemas.microsoft.com/office/drawing/2010/main">
+                  <a14:imgLayer r:embed="rId4">
+                    <a14:imgEffect>
+                      <a14:artisticPhotocopy/>
+                    </a14:imgEffect>
+                  </a14:imgLayer>
+                </a14:imgProps>
+              </a:ext>
+            </a:extLst>
+          </a:blip>
+          <a:stretch>
+            <a:fillRect/>
+          </a:stretch>
+        </p:blipFill>
+        <p:spPr>
+          <a:xfrm>
+            <a:off x="8113776" y="2231048"/>
+            <a:ext cx="1386928" cy="1386928"/>
+          </a:xfrm>
+          <a:prstGeom prst="rect">
+            <a:avLst/>
+          </a:prstGeom>
+        </p:spPr>
+      </p:pic>
+      <p:pic>
+        <p:nvPicPr>
+          <p:cNvPr id="9" name="Picture 8" descr="Shape&#10;&#10;Description automatically generated with low confidence">
+            <a:extLst>
+              <a:ext uri="{FF2B5EF4-FFF2-40B4-BE49-F238E27FC236}">
+                <a16:creationId xmlns:a16="http://schemas.microsoft.com/office/drawing/2014/main" id="{1880A499-D7DA-AD47-9120-E22B7FE7FAC0}"/>
+              </a:ext>
+            </a:extLst>
+          </p:cNvPr>
+          <p:cNvPicPr>
+            <a:picLocks noChangeAspect="1"/>
+          </p:cNvPicPr>
+          <p:nvPr/>
+        </p:nvPicPr>
+        <p:blipFill>
+          <a:blip r:embed="rId3">
+            <a:extLst>
+              <a:ext uri="{BEBA8EAE-BF5A-486C-A8C5-ECC9F3942E4B}">
+                <a14:imgProps xmlns:a14="http://schemas.microsoft.com/office/drawing/2010/main">
+                  <a14:imgLayer r:embed="rId4">
+                    <a14:imgEffect>
+                      <a14:artisticPhotocopy/>
+                    </a14:imgEffect>
+                  </a14:imgLayer>
+                </a14:imgProps>
+              </a:ext>
+            </a:extLst>
+          </a:blip>
+          <a:stretch>
+            <a:fillRect/>
+          </a:stretch>
+        </p:blipFill>
+        <p:spPr>
+          <a:xfrm>
+            <a:off x="7808976" y="4267112"/>
+            <a:ext cx="1386928" cy="1386928"/>
+          </a:xfrm>
+          <a:prstGeom prst="rect">
+            <a:avLst/>
+          </a:prstGeom>
+        </p:spPr>
+      </p:pic>
+      <p:pic>
+        <p:nvPicPr>
+          <p:cNvPr id="10" name="Picture 9" descr="Shape&#10;&#10;Description automatically generated with low confidence">
+            <a:extLst>
+              <a:ext uri="{FF2B5EF4-FFF2-40B4-BE49-F238E27FC236}">
+                <a16:creationId xmlns:a16="http://schemas.microsoft.com/office/drawing/2014/main" id="{3F1472E2-0CFB-7643-899E-8268C99594B6}"/>
+              </a:ext>
+            </a:extLst>
+          </p:cNvPr>
+          <p:cNvPicPr>
+            <a:picLocks noChangeAspect="1"/>
+          </p:cNvPicPr>
+          <p:nvPr/>
+        </p:nvPicPr>
+        <p:blipFill>
+          <a:blip r:embed="rId3">
+            <a:extLst>
+              <a:ext uri="{BEBA8EAE-BF5A-486C-A8C5-ECC9F3942E4B}">
+                <a14:imgProps xmlns:a14="http://schemas.microsoft.com/office/drawing/2010/main">
+                  <a14:imgLayer r:embed="rId4">
+                    <a14:imgEffect>
+                      <a14:artisticPhotocopy/>
+                    </a14:imgEffect>
+                  </a14:imgLayer>
+                </a14:imgProps>
+              </a:ext>
+            </a:extLst>
+          </a:blip>
+          <a:stretch>
+            <a:fillRect/>
+          </a:stretch>
+        </p:blipFill>
+        <p:spPr>
+          <a:xfrm>
+            <a:off x="5402536" y="5471072"/>
+            <a:ext cx="1386928" cy="1386928"/>
+          </a:xfrm>
+          <a:prstGeom prst="rect">
+            <a:avLst/>
+          </a:prstGeom>
+        </p:spPr>
+      </p:pic>
+      <p:pic>
+        <p:nvPicPr>
+          <p:cNvPr id="11" name="Picture 10" descr="Shape&#10;&#10;Description automatically generated with low confidence">
+            <a:extLst>
+              <a:ext uri="{FF2B5EF4-FFF2-40B4-BE49-F238E27FC236}">
+                <a16:creationId xmlns:a16="http://schemas.microsoft.com/office/drawing/2014/main" id="{6C2C7B65-61C8-5F4E-AD25-E021623ABC3A}"/>
+              </a:ext>
+            </a:extLst>
+          </p:cNvPr>
+          <p:cNvPicPr>
+            <a:picLocks noChangeAspect="1"/>
+          </p:cNvPicPr>
+          <p:nvPr/>
+        </p:nvPicPr>
+        <p:blipFill>
+          <a:blip r:embed="rId3">
+            <a:extLst>
+              <a:ext uri="{BEBA8EAE-BF5A-486C-A8C5-ECC9F3942E4B}">
+                <a14:imgProps xmlns:a14="http://schemas.microsoft.com/office/drawing/2010/main">
+                  <a14:imgLayer r:embed="rId4">
+                    <a14:imgEffect>
+                      <a14:artisticPhotocopy/>
+                    </a14:imgEffect>
+                  </a14:imgLayer>
+                </a14:imgProps>
+              </a:ext>
+            </a:extLst>
+          </a:blip>
+          <a:stretch>
+            <a:fillRect/>
+          </a:stretch>
+        </p:blipFill>
+        <p:spPr>
+          <a:xfrm>
+            <a:off x="2996096" y="4267112"/>
+            <a:ext cx="1386928" cy="1386928"/>
+          </a:xfrm>
+          <a:prstGeom prst="rect">
+            <a:avLst/>
+          </a:prstGeom>
+        </p:spPr>
+      </p:pic>
+      <p:pic>
+        <p:nvPicPr>
+          <p:cNvPr id="12" name="Picture 11" descr="Shape&#10;&#10;Description automatically generated with low confidence">
+            <a:extLst>
+              <a:ext uri="{FF2B5EF4-FFF2-40B4-BE49-F238E27FC236}">
+                <a16:creationId xmlns:a16="http://schemas.microsoft.com/office/drawing/2014/main" id="{01BB796F-ED0F-8E4F-B682-958D8CE201B2}"/>
+              </a:ext>
+            </a:extLst>
+          </p:cNvPr>
+          <p:cNvPicPr>
+            <a:picLocks noChangeAspect="1"/>
+          </p:cNvPicPr>
+          <p:nvPr/>
+        </p:nvPicPr>
+        <p:blipFill>
+          <a:blip r:embed="rId3">
+            <a:extLst>
+              <a:ext uri="{BEBA8EAE-BF5A-486C-A8C5-ECC9F3942E4B}">
+                <a14:imgProps xmlns:a14="http://schemas.microsoft.com/office/drawing/2010/main">
+                  <a14:imgLayer r:embed="rId4">
+                    <a14:imgEffect>
+                      <a14:artisticPhotocopy/>
+                    </a14:imgEffect>
+                  </a14:imgLayer>
+                </a14:imgProps>
+              </a:ext>
+            </a:extLst>
+          </a:blip>
+          <a:stretch>
+            <a:fillRect/>
+          </a:stretch>
+        </p:blipFill>
+        <p:spPr>
+          <a:xfrm>
+            <a:off x="2691296" y="2264488"/>
+            <a:ext cx="1386928" cy="1386928"/>
+          </a:xfrm>
+          <a:prstGeom prst="rect">
+            <a:avLst/>
+          </a:prstGeom>
+        </p:spPr>
+      </p:pic>
+      <p:pic>
+        <p:nvPicPr>
+          <p:cNvPr id="13" name="Picture 12" descr="Shape&#10;&#10;Description automatically generated with low confidence">
+            <a:extLst>
+              <a:ext uri="{FF2B5EF4-FFF2-40B4-BE49-F238E27FC236}">
+                <a16:creationId xmlns:a16="http://schemas.microsoft.com/office/drawing/2014/main" id="{35C08C6B-AD30-564C-8FD2-76106D25E67E}"/>
+              </a:ext>
+            </a:extLst>
+          </p:cNvPr>
+          <p:cNvPicPr>
+            <a:picLocks noChangeAspect="1"/>
+          </p:cNvPicPr>
+          <p:nvPr/>
+        </p:nvPicPr>
+        <p:blipFill>
+          <a:blip r:embed="rId3">
+            <a:extLst>
+              <a:ext uri="{BEBA8EAE-BF5A-486C-A8C5-ECC9F3942E4B}">
+                <a14:imgProps xmlns:a14="http://schemas.microsoft.com/office/drawing/2010/main">
+                  <a14:imgLayer r:embed="rId4">
+                    <a14:imgEffect>
+                      <a14:artisticPhotocopy/>
+                    </a14:imgEffect>
+                  </a14:imgLayer>
+                </a14:imgProps>
+              </a:ext>
+            </a:extLst>
+          </a:blip>
+          <a:stretch>
+            <a:fillRect/>
+          </a:stretch>
+        </p:blipFill>
+        <p:spPr>
+          <a:xfrm>
+            <a:off x="3136305" y="566840"/>
+            <a:ext cx="1386928" cy="1386928"/>
+          </a:xfrm>
+          <a:prstGeom prst="rect">
+            <a:avLst/>
+          </a:prstGeom>
+        </p:spPr>
+      </p:pic>
+      <p:pic>
+        <p:nvPicPr>
+          <p:cNvPr id="14" name="Picture 13" descr="Shape&#10;&#10;Description automatically generated with low confidence">
+            <a:extLst>
+              <a:ext uri="{FF2B5EF4-FFF2-40B4-BE49-F238E27FC236}">
+                <a16:creationId xmlns:a16="http://schemas.microsoft.com/office/drawing/2014/main" id="{F3AB5691-78AE-E349-941F-9CACF6B687B6}"/>
+              </a:ext>
+            </a:extLst>
+          </p:cNvPr>
+          <p:cNvPicPr>
+            <a:picLocks noChangeAspect="1"/>
+          </p:cNvPicPr>
+          <p:nvPr/>
+        </p:nvPicPr>
+        <p:blipFill>
+          <a:blip r:embed="rId3">
+            <a:extLst>
+              <a:ext uri="{BEBA8EAE-BF5A-486C-A8C5-ECC9F3942E4B}">
+                <a14:imgProps xmlns:a14="http://schemas.microsoft.com/office/drawing/2010/main">
+                  <a14:imgLayer r:embed="rId4">
+                    <a14:imgEffect>
+                      <a14:artisticPhotocopy/>
+                    </a14:imgEffect>
+                  </a14:imgLayer>
+                </a14:imgProps>
+              </a:ext>
+            </a:extLst>
+          </a:blip>
+          <a:stretch>
+            <a:fillRect/>
+          </a:stretch>
+        </p:blipFill>
+        <p:spPr>
+          <a:xfrm>
+            <a:off x="5402536" y="109640"/>
+            <a:ext cx="1386928" cy="1386928"/>
+          </a:xfrm>
+          <a:prstGeom prst="rect">
+            <a:avLst/>
+          </a:prstGeom>
+        </p:spPr>
+      </p:pic>
+      <p:pic>
+        <p:nvPicPr>
+          <p:cNvPr id="15" name="Picture 14" descr="Icon&#10;&#10;Description automatically generated">
+            <a:extLst>
+              <a:ext uri="{FF2B5EF4-FFF2-40B4-BE49-F238E27FC236}">
+                <a16:creationId xmlns:a16="http://schemas.microsoft.com/office/drawing/2014/main" id="{60A9AE1D-B6A5-E347-A221-0826E19BF2DE}"/>
+              </a:ext>
+            </a:extLst>
+          </p:cNvPr>
+          <p:cNvPicPr>
+            <a:picLocks noChangeAspect="1"/>
+          </p:cNvPicPr>
+          <p:nvPr/>
+        </p:nvPicPr>
+        <p:blipFill>
+          <a:blip r:embed="rId5"/>
+          <a:stretch>
+            <a:fillRect/>
+          </a:stretch>
+        </p:blipFill>
+        <p:spPr>
+          <a:xfrm>
+            <a:off x="10422892" y="5202395"/>
+            <a:ext cx="1441230" cy="1441230"/>
+          </a:xfrm>
+          <a:prstGeom prst="rect">
+            <a:avLst/>
+          </a:prstGeom>
+        </p:spPr>
+      </p:pic>
+    </p:spTree>
+    <p:extLst>
+      <p:ext uri="{BB962C8B-B14F-4D97-AF65-F5344CB8AC3E}">
+        <p14:creationId xmlns:p14="http://schemas.microsoft.com/office/powerpoint/2010/main" val="1213125924"/>
+      </p:ext>
+    </p:extLst>
+  </p:cSld>
+  <p:clrMapOvr>
+    <a:masterClrMapping/>
+  </p:clrMapOvr>
+</p:sld>
+</file>
+
+<file path=ppt/slides/slide6.xml><?xml version="1.0" encoding="utf-8"?>
+<p:sld xmlns:a="http://schemas.openxmlformats.org/drawingml/2006/main" xmlns:r="http://schemas.openxmlformats.org/officeDocument/2006/relationships" xmlns:p="http://schemas.openxmlformats.org/presentationml/2006/main">
+  <p:cSld>
+    <p:spTree>
+      <p:nvGrpSpPr>
+        <p:cNvPr id="1" name=""/>
+        <p:cNvGrpSpPr/>
+        <p:nvPr/>
+      </p:nvGrpSpPr>
+      <p:grpSpPr>
+        <a:xfrm>
+          <a:off x="0" y="0"/>
+          <a:ext cx="0" cy="0"/>
+          <a:chOff x="0" y="0"/>
+          <a:chExt cx="0" cy="0"/>
+        </a:xfrm>
+      </p:grpSpPr>
+      <p:pic>
+        <p:nvPicPr>
+          <p:cNvPr id="5" name="Content Placeholder 4" descr="Icon&#10;&#10;Description automatically generated">
+            <a:extLst>
+              <a:ext uri="{FF2B5EF4-FFF2-40B4-BE49-F238E27FC236}">
+                <a16:creationId xmlns:a16="http://schemas.microsoft.com/office/drawing/2014/main" id="{24ACE86D-6B9F-A14A-98FC-1AA3D403869E}"/>
+              </a:ext>
+            </a:extLst>
+          </p:cNvPr>
+          <p:cNvPicPr>
+            <a:picLocks noGrp="1" noChangeAspect="1"/>
+          </p:cNvPicPr>
+          <p:nvPr>
+            <p:ph idx="1"/>
+          </p:nvPr>
+        </p:nvPicPr>
+        <p:blipFill>
+          <a:blip r:embed="rId3"/>
+          <a:stretch>
+            <a:fillRect/>
+          </a:stretch>
+        </p:blipFill>
+        <p:spPr>
+          <a:xfrm>
+            <a:off x="4961382" y="2294382"/>
+            <a:ext cx="2269236" cy="2269236"/>
+          </a:xfrm>
+        </p:spPr>
+      </p:pic>
+      <p:pic>
+        <p:nvPicPr>
+          <p:cNvPr id="7" name="Picture 6" descr="A picture containing text, clock&#10;&#10;Description automatically generated">
+            <a:extLst>
+              <a:ext uri="{FF2B5EF4-FFF2-40B4-BE49-F238E27FC236}">
+                <a16:creationId xmlns:a16="http://schemas.microsoft.com/office/drawing/2014/main" id="{93369EC0-B178-D74A-8E77-7158DCFDFA83}"/>
+              </a:ext>
+            </a:extLst>
+          </p:cNvPr>
+          <p:cNvPicPr>
+            <a:picLocks noChangeAspect="1"/>
+          </p:cNvPicPr>
+          <p:nvPr/>
+        </p:nvPicPr>
+        <p:blipFill>
+          <a:blip r:embed="rId4"/>
+          <a:stretch>
+            <a:fillRect/>
+          </a:stretch>
+        </p:blipFill>
+        <p:spPr>
+          <a:xfrm>
+            <a:off x="4450080" y="3986784"/>
+            <a:ext cx="1329130" cy="1325880"/>
+          </a:xfrm>
+          <a:prstGeom prst="rect">
+            <a:avLst/>
+          </a:prstGeom>
+        </p:spPr>
+      </p:pic>
+    </p:spTree>
+    <p:extLst>
+      <p:ext uri="{BB962C8B-B14F-4D97-AF65-F5344CB8AC3E}">
+        <p14:creationId xmlns:p14="http://schemas.microsoft.com/office/powerpoint/2010/main" val="1146067761"/>
+      </p:ext>
+    </p:extLst>
+  </p:cSld>
+  <p:clrMapOvr>
+    <a:masterClrMapping/>
+  </p:clrMapOvr>
+</p:sld>
+</file>
+
+<file path=ppt/slides/slide7.xml><?xml version="1.0" encoding="utf-8"?>
+<p:sld xmlns:a="http://schemas.openxmlformats.org/drawingml/2006/main" xmlns:r="http://schemas.openxmlformats.org/officeDocument/2006/relationships" xmlns:p="http://schemas.openxmlformats.org/presentationml/2006/main">
+  <p:cSld>
+    <p:spTree>
+      <p:nvGrpSpPr>
+        <p:cNvPr id="1" name=""/>
+        <p:cNvGrpSpPr/>
+        <p:nvPr/>
+      </p:nvGrpSpPr>
+      <p:grpSpPr>
+        <a:xfrm>
+          <a:off x="0" y="0"/>
+          <a:ext cx="0" cy="0"/>
+          <a:chOff x="0" y="0"/>
+          <a:chExt cx="0" cy="0"/>
+        </a:xfrm>
+      </p:grpSpPr>
+      <p:pic>
+        <p:nvPicPr>
+          <p:cNvPr id="1026" name="Picture 2" descr="App Privacy Labels">
+            <a:extLst>
+              <a:ext uri="{FF2B5EF4-FFF2-40B4-BE49-F238E27FC236}">
+                <a16:creationId xmlns:a16="http://schemas.microsoft.com/office/drawing/2014/main" id="{E18CA3AE-B0EF-B64D-9E2F-7AA4981DBD92}"/>
+              </a:ext>
+            </a:extLst>
+          </p:cNvPr>
+          <p:cNvPicPr>
+            <a:picLocks noChangeAspect="1" noChangeArrowheads="1"/>
+          </p:cNvPicPr>
+          <p:nvPr/>
+        </p:nvPicPr>
+        <p:blipFill>
+          <a:blip r:embed="rId2">
+            <a:extLst>
+              <a:ext uri="{28A0092B-C50C-407E-A947-70E740481C1C}">
+                <a14:useLocalDpi xmlns:a14="http://schemas.microsoft.com/office/drawing/2010/main" val="0"/>
+              </a:ext>
+            </a:extLst>
+          </a:blip>
+          <a:srcRect/>
+          <a:stretch>
+            <a:fillRect/>
+          </a:stretch>
+        </p:blipFill>
+        <p:spPr bwMode="auto">
+          <a:xfrm>
+            <a:off x="800100" y="781050"/>
+            <a:ext cx="10591800" cy="5295900"/>
+          </a:xfrm>
+          <a:prstGeom prst="rect">
+            <a:avLst/>
+          </a:prstGeom>
+          <a:noFill/>
+          <a:extLst>
+            <a:ext uri="{909E8E84-426E-40DD-AFC4-6F175D3DCCD1}">
+              <a14:hiddenFill xmlns:a14="http://schemas.microsoft.com/office/drawing/2010/main">
+                <a:solidFill>
+                  <a:srgbClr val="FFFFFF"/>
+                </a:solidFill>
+              </a14:hiddenFill>
+            </a:ext>
+          </a:extLst>
+        </p:spPr>
+      </p:pic>
+    </p:spTree>
+    <p:extLst>
+      <p:ext uri="{BB962C8B-B14F-4D97-AF65-F5344CB8AC3E}">
+        <p14:creationId xmlns:p14="http://schemas.microsoft.com/office/powerpoint/2010/main" val="1964935150"/>
+      </p:ext>
+    </p:extLst>
+  </p:cSld>
+  <p:clrMapOvr>
+    <a:masterClrMapping/>
+  </p:clrMapOvr>
+</p:sld>
+</file>
+
+<file path=ppt/slides/slide8.xml><?xml version="1.0" encoding="utf-8"?>
+<p:sld xmlns:a="http://schemas.openxmlformats.org/drawingml/2006/main" xmlns:r="http://schemas.openxmlformats.org/officeDocument/2006/relationships" xmlns:p="http://schemas.openxmlformats.org/presentationml/2006/main">
+  <p:cSld>
+    <p:spTree>
+      <p:nvGrpSpPr>
+        <p:cNvPr id="1" name=""/>
+        <p:cNvGrpSpPr/>
+        <p:nvPr/>
+      </p:nvGrpSpPr>
+      <p:grpSpPr>
+        <a:xfrm>
+          <a:off x="0" y="0"/>
+          <a:ext cx="0" cy="0"/>
+          <a:chOff x="0" y="0"/>
+          <a:chExt cx="0" cy="0"/>
+        </a:xfrm>
+      </p:grpSpPr>
+      <p:pic>
+        <p:nvPicPr>
+          <p:cNvPr id="6" name="Picture 5" descr="Icon&#10;&#10;Description automatically generated">
+            <a:extLst>
+              <a:ext uri="{FF2B5EF4-FFF2-40B4-BE49-F238E27FC236}">
+                <a16:creationId xmlns:a16="http://schemas.microsoft.com/office/drawing/2014/main" id="{71AD5B8F-518B-5845-BDF0-AAC4E364FFF6}"/>
+              </a:ext>
+            </a:extLst>
+          </p:cNvPr>
+          <p:cNvPicPr>
+            <a:picLocks noChangeAspect="1"/>
+          </p:cNvPicPr>
+          <p:nvPr/>
+        </p:nvPicPr>
+        <p:blipFill>
+          <a:blip r:embed="rId3"/>
+          <a:stretch>
+            <a:fillRect/>
+          </a:stretch>
+        </p:blipFill>
+        <p:spPr>
+          <a:xfrm>
+            <a:off x="5058917" y="2391917"/>
+            <a:ext cx="2074165" cy="2074165"/>
+          </a:xfrm>
+          <a:prstGeom prst="rect">
+            <a:avLst/>
+          </a:prstGeom>
+        </p:spPr>
+      </p:pic>
+    </p:spTree>
+    <p:extLst>
+      <p:ext uri="{BB962C8B-B14F-4D97-AF65-F5344CB8AC3E}">
+        <p14:creationId xmlns:p14="http://schemas.microsoft.com/office/powerpoint/2010/main" val="4213995864"/>
+      </p:ext>
+    </p:extLst>
+  </p:cSld>
+  <p:clrMapOvr>
+    <a:masterClrMapping/>
+  </p:clrMapOvr>
+</p:sld>
+</file>
+
+<file path=ppt/slides/slide9.xml><?xml version="1.0" encoding="utf-8"?>
+<p:sld xmlns:a="http://schemas.openxmlformats.org/drawingml/2006/main" xmlns:r="http://schemas.openxmlformats.org/officeDocument/2006/relationships" xmlns:p="http://schemas.openxmlformats.org/presentationml/2006/main">
+  <p:cSld>
+    <p:spTree>
+      <p:nvGrpSpPr>
+        <p:cNvPr id="1" name=""/>
+        <p:cNvGrpSpPr/>
+        <p:nvPr/>
+      </p:nvGrpSpPr>
+      <p:grpSpPr>
+        <a:xfrm>
+          <a:off x="0" y="0"/>
+          <a:ext cx="0" cy="0"/>
+          <a:chOff x="0" y="0"/>
+          <a:chExt cx="0" cy="0"/>
+        </a:xfrm>
+      </p:grpSpPr>
+      <p:sp>
+        <p:nvSpPr>
+          <p:cNvPr id="2" name="Title 1">
+            <a:extLst>
+              <a:ext uri="{FF2B5EF4-FFF2-40B4-BE49-F238E27FC236}">
+                <a16:creationId xmlns:a16="http://schemas.microsoft.com/office/drawing/2014/main" id="{4A453760-DA5A-B84D-9F91-524D0BAEFAAF}"/>
+              </a:ext>
+            </a:extLst>
+          </p:cNvPr>
+          <p:cNvSpPr>
+            <a:spLocks noGrp="1"/>
+          </p:cNvSpPr>
+          <p:nvPr>
+            <p:ph type="title"/>
+          </p:nvPr>
+        </p:nvSpPr>
+        <p:spPr/>
+        <p:txBody>
+          <a:bodyPr/>
+          <a:lstStyle/>
+          <a:p>
+            <a:r>
+              <a:rPr lang="en-US" dirty="0"/>
+              <a:t>Research</a:t>
+            </a:r>
+          </a:p>
+        </p:txBody>
+      </p:sp>
+      <p:sp>
+        <p:nvSpPr>
+          <p:cNvPr id="3" name="Content Placeholder 2">
+            <a:extLst>
+              <a:ext uri="{FF2B5EF4-FFF2-40B4-BE49-F238E27FC236}">
+                <a16:creationId xmlns:a16="http://schemas.microsoft.com/office/drawing/2014/main" id="{353EFA43-2769-A94A-A295-89D2DBD628CC}"/>
+              </a:ext>
+            </a:extLst>
+          </p:cNvPr>
+          <p:cNvSpPr>
+            <a:spLocks noGrp="1"/>
+          </p:cNvSpPr>
+          <p:nvPr>
+            <p:ph idx="1"/>
+          </p:nvPr>
+        </p:nvSpPr>
+        <p:spPr>
+          <a:xfrm>
+            <a:off x="1141413" y="2006353"/>
+            <a:ext cx="9905998" cy="3784847"/>
+          </a:xfrm>
+        </p:spPr>
+        <p:txBody>
+          <a:bodyPr>
+            <a:normAutofit fontScale="92500" lnSpcReduction="10000"/>
+          </a:bodyPr>
+          <a:lstStyle/>
+          <a:p>
+            <a:r>
+              <a:rPr lang="en-US" dirty="0">
+                <a:hlinkClick r:id="rId2"/>
+              </a:rPr>
+              <a:t>https://www.fastcompany.com/90593066/whatsapp-facebook-privacy-ultimatum?partner=feedburner&amp;utm_source=feedburner&amp;utm_medium=feed&amp;utm_campaign=feedburner+fastcompany&amp;utm_content=feedburner&amp;cid=eem524:524:s00:01/12/2021_fc</a:t>
+            </a:r>
+            <a:endParaRPr lang="en-US" dirty="0"/>
+          </a:p>
+          <a:p>
+            <a:r>
+              <a:rPr lang="en-GB" dirty="0">
+                <a:effectLst/>
+                <a:hlinkClick r:id="rId3" tooltip="https://www.forbes.com/sites/zakdoffman/2021/02/28/whatsapp-warns-millions-of-apple-iphone-and-google-android-users-after-privacy-backlash/"/>
+              </a:rPr>
+              <a:t>https://www.forbes.com/sites/zakdoffman/2021/02/28/whatsapp-warns-millions-of-apple-iphone-and-google-android-users-after-privacy-backlash/</a:t>
+            </a:r>
+            <a:endParaRPr lang="en-GB" dirty="0">
+              <a:effectLst/>
+            </a:endParaRPr>
+          </a:p>
+          <a:p>
+            <a:r>
+              <a:rPr lang="en-US" dirty="0">
+                <a:hlinkClick r:id="rId4"/>
+              </a:rPr>
+              <a:t>https://bgr.com/2021/02/23/gmail-app-privacy-label-iphone-user-tracking/</a:t>
+            </a:r>
+            <a:endParaRPr lang="en-US" dirty="0"/>
+          </a:p>
+          <a:p>
+            <a:r>
+              <a:rPr lang="en-US" dirty="0">
+                <a:hlinkClick r:id="rId5"/>
+              </a:rPr>
+              <a:t>https://twitter.com/endnowcyber/status/1357251207534768137?s=21</a:t>
+            </a:r>
+            <a:endParaRPr lang="en-US" dirty="0"/>
+          </a:p>
+          <a:p>
+            <a:r>
+              <a:rPr lang="en-US" dirty="0">
+                <a:hlinkClick r:id="rId6"/>
+              </a:rPr>
+              <a:t>https://www-theverge-com.cdn.ampproject.org/c/s/www.theverge.com/platform/amp/2021/2/18/22289232/facebook-ad-revenue-proposed-reach-inflation-lawsuit-unredacted-filings</a:t>
+            </a:r>
+            <a:endParaRPr lang="en-US" dirty="0"/>
+          </a:p>
+          <a:p>
+            <a:endParaRPr lang="en-US" dirty="0"/>
+          </a:p>
+          <a:p>
+            <a:endParaRPr lang="en-US" dirty="0"/>
+          </a:p>
+        </p:txBody>
+      </p:sp>
+    </p:spTree>
+    <p:extLst>
+      <p:ext uri="{BB962C8B-B14F-4D97-AF65-F5344CB8AC3E}">
+        <p14:creationId xmlns:p14="http://schemas.microsoft.com/office/powerpoint/2010/main" val="3165174271"/>
       </p:ext>
     </p:extLst>
   </p:cSld>
@@ -6087,4 +8514,299 @@
     </a:ext>
   </a:extLst>
 </a:theme>
+</file>
+
+<file path=ppt/theme/theme2.xml><?xml version="1.0" encoding="utf-8"?>
+<a:theme xmlns:a="http://schemas.openxmlformats.org/drawingml/2006/main" name="Office Theme">
+  <a:themeElements>
+    <a:clrScheme name="Office">
+      <a:dk1>
+        <a:sysClr val="windowText" lastClr="000000"/>
+      </a:dk1>
+      <a:lt1>
+        <a:sysClr val="window" lastClr="FFFFFF"/>
+      </a:lt1>
+      <a:dk2>
+        <a:srgbClr val="44546A"/>
+      </a:dk2>
+      <a:lt2>
+        <a:srgbClr val="E7E6E6"/>
+      </a:lt2>
+      <a:accent1>
+        <a:srgbClr val="4472C4"/>
+      </a:accent1>
+      <a:accent2>
+        <a:srgbClr val="ED7D31"/>
+      </a:accent2>
+      <a:accent3>
+        <a:srgbClr val="A5A5A5"/>
+      </a:accent3>
+      <a:accent4>
+        <a:srgbClr val="FFC000"/>
+      </a:accent4>
+      <a:accent5>
+        <a:srgbClr val="5B9BD5"/>
+      </a:accent5>
+      <a:accent6>
+        <a:srgbClr val="70AD47"/>
+      </a:accent6>
+      <a:hlink>
+        <a:srgbClr val="0563C1"/>
+      </a:hlink>
+      <a:folHlink>
+        <a:srgbClr val="954F72"/>
+      </a:folHlink>
+    </a:clrScheme>
+    <a:fontScheme name="Office">
+      <a:majorFont>
+        <a:latin typeface="Calibri Light" panose="020F0302020204030204"/>
+        <a:ea typeface=""/>
+        <a:cs typeface=""/>
+        <a:font script="Jpan" typeface="游ゴシック Light"/>
+        <a:font script="Hang" typeface="맑은 고딕"/>
+        <a:font script="Hans" typeface="等线 Light"/>
+        <a:font script="Hant" typeface="新細明體"/>
+        <a:font script="Arab" typeface="Times New Roman"/>
+        <a:font script="Hebr" typeface="Times New Roman"/>
+        <a:font script="Thai" typeface="Angsana New"/>
+        <a:font script="Ethi" typeface="Nyala"/>
+        <a:font script="Beng" typeface="Vrinda"/>
+        <a:font script="Gujr" typeface="Shruti"/>
+        <a:font script="Khmr" typeface="MoolBoran"/>
+        <a:font script="Knda" typeface="Tunga"/>
+        <a:font script="Guru" typeface="Raavi"/>
+        <a:font script="Cans" typeface="Euphemia"/>
+        <a:font script="Cher" typeface="Plantagenet Cherokee"/>
+        <a:font script="Yiii" typeface="Microsoft Yi Baiti"/>
+        <a:font script="Tibt" typeface="Microsoft Himalaya"/>
+        <a:font script="Thaa" typeface="MV Boli"/>
+        <a:font script="Deva" typeface="Mangal"/>
+        <a:font script="Telu" typeface="Gautami"/>
+        <a:font script="Taml" typeface="Latha"/>
+        <a:font script="Syrc" typeface="Estrangelo Edessa"/>
+        <a:font script="Orya" typeface="Kalinga"/>
+        <a:font script="Mlym" typeface="Kartika"/>
+        <a:font script="Laoo" typeface="DokChampa"/>
+        <a:font script="Sinh" typeface="Iskoola Pota"/>
+        <a:font script="Mong" typeface="Mongolian Baiti"/>
+        <a:font script="Viet" typeface="Times New Roman"/>
+        <a:font script="Uigh" typeface="Microsoft Uighur"/>
+        <a:font script="Geor" typeface="Sylfaen"/>
+        <a:font script="Armn" typeface="Arial"/>
+        <a:font script="Bugi" typeface="Leelawadee UI"/>
+        <a:font script="Bopo" typeface="Microsoft JhengHei"/>
+        <a:font script="Java" typeface="Javanese Text"/>
+        <a:font script="Lisu" typeface="Segoe UI"/>
+        <a:font script="Mymr" typeface="Myanmar Text"/>
+        <a:font script="Nkoo" typeface="Ebrima"/>
+        <a:font script="Olck" typeface="Nirmala UI"/>
+        <a:font script="Osma" typeface="Ebrima"/>
+        <a:font script="Phag" typeface="Phagspa"/>
+        <a:font script="Syrn" typeface="Estrangelo Edessa"/>
+        <a:font script="Syrj" typeface="Estrangelo Edessa"/>
+        <a:font script="Syre" typeface="Estrangelo Edessa"/>
+        <a:font script="Sora" typeface="Nirmala UI"/>
+        <a:font script="Tale" typeface="Microsoft Tai Le"/>
+        <a:font script="Talu" typeface="Microsoft New Tai Lue"/>
+        <a:font script="Tfng" typeface="Ebrima"/>
+      </a:majorFont>
+      <a:minorFont>
+        <a:latin typeface="Calibri" panose="020F0502020204030204"/>
+        <a:ea typeface=""/>
+        <a:cs typeface=""/>
+        <a:font script="Jpan" typeface="游ゴシック"/>
+        <a:font script="Hang" typeface="맑은 고딕"/>
+        <a:font script="Hans" typeface="等线"/>
+        <a:font script="Hant" typeface="新細明體"/>
+        <a:font script="Arab" typeface="Arial"/>
+        <a:font script="Hebr" typeface="Arial"/>
+        <a:font script="Thai" typeface="Cordia New"/>
+        <a:font script="Ethi" typeface="Nyala"/>
+        <a:font script="Beng" typeface="Vrinda"/>
+        <a:font script="Gujr" typeface="Shruti"/>
+        <a:font script="Khmr" typeface="DaunPenh"/>
+        <a:font script="Knda" typeface="Tunga"/>
+        <a:font script="Guru" typeface="Raavi"/>
+        <a:font script="Cans" typeface="Euphemia"/>
+        <a:font script="Cher" typeface="Plantagenet Cherokee"/>
+        <a:font script="Yiii" typeface="Microsoft Yi Baiti"/>
+        <a:font script="Tibt" typeface="Microsoft Himalaya"/>
+        <a:font script="Thaa" typeface="MV Boli"/>
+        <a:font script="Deva" typeface="Mangal"/>
+        <a:font script="Telu" typeface="Gautami"/>
+        <a:font script="Taml" typeface="Latha"/>
+        <a:font script="Syrc" typeface="Estrangelo Edessa"/>
+        <a:font script="Orya" typeface="Kalinga"/>
+        <a:font script="Mlym" typeface="Kartika"/>
+        <a:font script="Laoo" typeface="DokChampa"/>
+        <a:font script="Sinh" typeface="Iskoola Pota"/>
+        <a:font script="Mong" typeface="Mongolian Baiti"/>
+        <a:font script="Viet" typeface="Arial"/>
+        <a:font script="Uigh" typeface="Microsoft Uighur"/>
+        <a:font script="Geor" typeface="Sylfaen"/>
+        <a:font script="Armn" typeface="Arial"/>
+        <a:font script="Bugi" typeface="Leelawadee UI"/>
+        <a:font script="Bopo" typeface="Microsoft JhengHei"/>
+        <a:font script="Java" typeface="Javanese Text"/>
+        <a:font script="Lisu" typeface="Segoe UI"/>
+        <a:font script="Mymr" typeface="Myanmar Text"/>
+        <a:font script="Nkoo" typeface="Ebrima"/>
+        <a:font script="Olck" typeface="Nirmala UI"/>
+        <a:font script="Osma" typeface="Ebrima"/>
+        <a:font script="Phag" typeface="Phagspa"/>
+        <a:font script="Syrn" typeface="Estrangelo Edessa"/>
+        <a:font script="Syrj" typeface="Estrangelo Edessa"/>
+        <a:font script="Syre" typeface="Estrangelo Edessa"/>
+        <a:font script="Sora" typeface="Nirmala UI"/>
+        <a:font script="Tale" typeface="Microsoft Tai Le"/>
+        <a:font script="Talu" typeface="Microsoft New Tai Lue"/>
+        <a:font script="Tfng" typeface="Ebrima"/>
+      </a:minorFont>
+    </a:fontScheme>
+    <a:fmtScheme name="Office">
+      <a:fillStyleLst>
+        <a:solidFill>
+          <a:schemeClr val="phClr"/>
+        </a:solidFill>
+        <a:gradFill rotWithShape="1">
+          <a:gsLst>
+            <a:gs pos="0">
+              <a:schemeClr val="phClr">
+                <a:lumMod val="110000"/>
+                <a:satMod val="105000"/>
+                <a:tint val="67000"/>
+              </a:schemeClr>
+            </a:gs>
+            <a:gs pos="50000">
+              <a:schemeClr val="phClr">
+                <a:lumMod val="105000"/>
+                <a:satMod val="103000"/>
+                <a:tint val="73000"/>
+              </a:schemeClr>
+            </a:gs>
+            <a:gs pos="100000">
+              <a:schemeClr val="phClr">
+                <a:lumMod val="105000"/>
+                <a:satMod val="109000"/>
+                <a:tint val="81000"/>
+              </a:schemeClr>
+            </a:gs>
+          </a:gsLst>
+          <a:lin ang="5400000" scaled="0"/>
+        </a:gradFill>
+        <a:gradFill rotWithShape="1">
+          <a:gsLst>
+            <a:gs pos="0">
+              <a:schemeClr val="phClr">
+                <a:satMod val="103000"/>
+                <a:lumMod val="102000"/>
+                <a:tint val="94000"/>
+              </a:schemeClr>
+            </a:gs>
+            <a:gs pos="50000">
+              <a:schemeClr val="phClr">
+                <a:satMod val="110000"/>
+                <a:lumMod val="100000"/>
+                <a:shade val="100000"/>
+              </a:schemeClr>
+            </a:gs>
+            <a:gs pos="100000">
+              <a:schemeClr val="phClr">
+                <a:lumMod val="99000"/>
+                <a:satMod val="120000"/>
+                <a:shade val="78000"/>
+              </a:schemeClr>
+            </a:gs>
+          </a:gsLst>
+          <a:lin ang="5400000" scaled="0"/>
+        </a:gradFill>
+      </a:fillStyleLst>
+      <a:lnStyleLst>
+        <a:ln w="6350" cap="flat" cmpd="sng" algn="ctr">
+          <a:solidFill>
+            <a:schemeClr val="phClr"/>
+          </a:solidFill>
+          <a:prstDash val="solid"/>
+          <a:miter lim="800000"/>
+        </a:ln>
+        <a:ln w="12700" cap="flat" cmpd="sng" algn="ctr">
+          <a:solidFill>
+            <a:schemeClr val="phClr"/>
+          </a:solidFill>
+          <a:prstDash val="solid"/>
+          <a:miter lim="800000"/>
+        </a:ln>
+        <a:ln w="19050" cap="flat" cmpd="sng" algn="ctr">
+          <a:solidFill>
+            <a:schemeClr val="phClr"/>
+          </a:solidFill>
+          <a:prstDash val="solid"/>
+          <a:miter lim="800000"/>
+        </a:ln>
+      </a:lnStyleLst>
+      <a:effectStyleLst>
+        <a:effectStyle>
+          <a:effectLst/>
+        </a:effectStyle>
+        <a:effectStyle>
+          <a:effectLst/>
+        </a:effectStyle>
+        <a:effectStyle>
+          <a:effectLst>
+            <a:outerShdw blurRad="57150" dist="19050" dir="5400000" algn="ctr" rotWithShape="0">
+              <a:srgbClr val="000000">
+                <a:alpha val="63000"/>
+              </a:srgbClr>
+            </a:outerShdw>
+          </a:effectLst>
+        </a:effectStyle>
+      </a:effectStyleLst>
+      <a:bgFillStyleLst>
+        <a:solidFill>
+          <a:schemeClr val="phClr"/>
+        </a:solidFill>
+        <a:solidFill>
+          <a:schemeClr val="phClr">
+            <a:tint val="95000"/>
+            <a:satMod val="170000"/>
+          </a:schemeClr>
+        </a:solidFill>
+        <a:gradFill rotWithShape="1">
+          <a:gsLst>
+            <a:gs pos="0">
+              <a:schemeClr val="phClr">
+                <a:tint val="93000"/>
+                <a:satMod val="150000"/>
+                <a:shade val="98000"/>
+                <a:lumMod val="102000"/>
+              </a:schemeClr>
+            </a:gs>
+            <a:gs pos="50000">
+              <a:schemeClr val="phClr">
+                <a:tint val="98000"/>
+                <a:satMod val="130000"/>
+                <a:shade val="90000"/>
+                <a:lumMod val="103000"/>
+              </a:schemeClr>
+            </a:gs>
+            <a:gs pos="100000">
+              <a:schemeClr val="phClr">
+                <a:shade val="63000"/>
+                <a:satMod val="120000"/>
+              </a:schemeClr>
+            </a:gs>
+          </a:gsLst>
+          <a:lin ang="5400000" scaled="0"/>
+        </a:gradFill>
+      </a:bgFillStyleLst>
+    </a:fmtScheme>
+  </a:themeElements>
+  <a:objectDefaults/>
+  <a:extraClrSchemeLst/>
+  <a:extLst>
+    <a:ext uri="{05A4C25C-085E-4340-85A3-A5531E510DB2}">
+      <thm15:themeFamily xmlns:thm15="http://schemas.microsoft.com/office/thememl/2012/main" name="Office Theme" id="{62F939B6-93AF-4DB8-9C6B-D6C7DFDC589F}" vid="{4A3C46E8-61CC-4603-A589-7422A47A8E4A}"/>
+    </a:ext>
+  </a:extLst>
+</a:theme>
 </file>
</xml_diff>